<commit_message>
Rough Draft of Presentation Complete
</commit_message>
<xml_diff>
--- a/Presentations/AIAASciTechPresentation.pptx
+++ b/Presentations/AIAASciTechPresentation.pptx
@@ -6,12 +6,16 @@
   </p:sldMasterIdLst>
   <p:sldIdLst>
     <p:sldId id="256" r:id="rId2"/>
-    <p:sldId id="257" r:id="rId3"/>
-    <p:sldId id="260" r:id="rId4"/>
-    <p:sldId id="258" r:id="rId5"/>
-    <p:sldId id="261" r:id="rId6"/>
-    <p:sldId id="262" r:id="rId7"/>
-    <p:sldId id="259" r:id="rId8"/>
+    <p:sldId id="259" r:id="rId3"/>
+    <p:sldId id="257" r:id="rId4"/>
+    <p:sldId id="261" r:id="rId5"/>
+    <p:sldId id="260" r:id="rId6"/>
+    <p:sldId id="258" r:id="rId7"/>
+    <p:sldId id="266" r:id="rId8"/>
+    <p:sldId id="265" r:id="rId9"/>
+    <p:sldId id="264" r:id="rId10"/>
+    <p:sldId id="263" r:id="rId11"/>
+    <p:sldId id="262" r:id="rId12"/>
   </p:sldIdLst>
   <p:sldSz cx="12192000" cy="6858000"/>
   <p:notesSz cx="6858000" cy="9144000"/>
@@ -344,7 +348,7 @@
           <a:p>
             <a:fld id="{694187F8-31A1-468B-8320-121A8C81D569}" type="datetimeFigureOut">
               <a:rPr lang="en-US" smtClean="0"/>
-              <a:t>12/8/2020</a:t>
+              <a:t>12/9/2020</a:t>
             </a:fld>
             <a:endParaRPr lang="en-US"/>
           </a:p>
@@ -552,7 +556,7 @@
           <a:p>
             <a:fld id="{694187F8-31A1-468B-8320-121A8C81D569}" type="datetimeFigureOut">
               <a:rPr lang="en-US" smtClean="0"/>
-              <a:t>12/8/2020</a:t>
+              <a:t>12/9/2020</a:t>
             </a:fld>
             <a:endParaRPr lang="en-US"/>
           </a:p>
@@ -808,7 +812,7 @@
           <a:p>
             <a:fld id="{694187F8-31A1-468B-8320-121A8C81D569}" type="datetimeFigureOut">
               <a:rPr lang="en-US" smtClean="0"/>
-              <a:t>12/8/2020</a:t>
+              <a:t>12/9/2020</a:t>
             </a:fld>
             <a:endParaRPr lang="en-US"/>
           </a:p>
@@ -978,7 +982,7 @@
           <a:p>
             <a:fld id="{694187F8-31A1-468B-8320-121A8C81D569}" type="datetimeFigureOut">
               <a:rPr lang="en-US" smtClean="0"/>
-              <a:t>12/8/2020</a:t>
+              <a:t>12/9/2020</a:t>
             </a:fld>
             <a:endParaRPr lang="en-US"/>
           </a:p>
@@ -1321,7 +1325,7 @@
           <a:p>
             <a:fld id="{694187F8-31A1-468B-8320-121A8C81D569}" type="datetimeFigureOut">
               <a:rPr lang="en-US" smtClean="0"/>
-              <a:t>12/8/2020</a:t>
+              <a:t>12/9/2020</a:t>
             </a:fld>
             <a:endParaRPr lang="en-US"/>
           </a:p>
@@ -1596,7 +1600,7 @@
           <a:p>
             <a:fld id="{694187F8-31A1-468B-8320-121A8C81D569}" type="datetimeFigureOut">
               <a:rPr lang="en-US" smtClean="0"/>
-              <a:t>12/8/2020</a:t>
+              <a:t>12/9/2020</a:t>
             </a:fld>
             <a:endParaRPr lang="en-US"/>
           </a:p>
@@ -1975,7 +1979,7 @@
           <a:p>
             <a:fld id="{694187F8-31A1-468B-8320-121A8C81D569}" type="datetimeFigureOut">
               <a:rPr lang="en-US" smtClean="0"/>
-              <a:t>12/8/2020</a:t>
+              <a:t>12/9/2020</a:t>
             </a:fld>
             <a:endParaRPr lang="en-US"/>
           </a:p>
@@ -2093,7 +2097,7 @@
           <a:p>
             <a:fld id="{694187F8-31A1-468B-8320-121A8C81D569}" type="datetimeFigureOut">
               <a:rPr lang="en-US" smtClean="0"/>
-              <a:t>12/8/2020</a:t>
+              <a:t>12/9/2020</a:t>
             </a:fld>
             <a:endParaRPr lang="en-US"/>
           </a:p>
@@ -2264,7 +2268,7 @@
           <a:p>
             <a:fld id="{694187F8-31A1-468B-8320-121A8C81D569}" type="datetimeFigureOut">
               <a:rPr lang="en-US" smtClean="0"/>
-              <a:t>12/8/2020</a:t>
+              <a:t>12/9/2020</a:t>
             </a:fld>
             <a:endParaRPr lang="en-US"/>
           </a:p>
@@ -2618,7 +2622,7 @@
           <a:p>
             <a:fld id="{694187F8-31A1-468B-8320-121A8C81D569}" type="datetimeFigureOut">
               <a:rPr lang="en-US" smtClean="0"/>
-              <a:t>12/8/2020</a:t>
+              <a:t>12/9/2020</a:t>
             </a:fld>
             <a:endParaRPr lang="en-US"/>
           </a:p>
@@ -2995,7 +2999,7 @@
           <a:p>
             <a:fld id="{694187F8-31A1-468B-8320-121A8C81D569}" type="datetimeFigureOut">
               <a:rPr lang="en-US" smtClean="0"/>
-              <a:t>12/8/2020</a:t>
+              <a:t>12/9/2020</a:t>
             </a:fld>
             <a:endParaRPr lang="en-US"/>
           </a:p>
@@ -3282,7 +3286,7 @@
           <a:p>
             <a:fld id="{694187F8-31A1-468B-8320-121A8C81D569}" type="datetimeFigureOut">
               <a:rPr lang="en-US" smtClean="0"/>
-              <a:t>12/8/2020</a:t>
+              <a:t>12/9/2020</a:t>
             </a:fld>
             <a:endParaRPr lang="en-US"/>
           </a:p>
@@ -3969,6 +3973,793 @@
 </p:sld>
 </file>
 
+<file path=ppt/slides/slide10.xml><?xml version="1.0" encoding="utf-8"?>
+<p:sld xmlns:a="http://schemas.openxmlformats.org/drawingml/2006/main" xmlns:r="http://schemas.openxmlformats.org/officeDocument/2006/relationships" xmlns:p="http://schemas.openxmlformats.org/presentationml/2006/main">
+  <p:cSld>
+    <p:spTree>
+      <p:nvGrpSpPr>
+        <p:cNvPr id="1" name=""/>
+        <p:cNvGrpSpPr/>
+        <p:nvPr/>
+      </p:nvGrpSpPr>
+      <p:grpSpPr>
+        <a:xfrm>
+          <a:off x="0" y="0"/>
+          <a:ext cx="0" cy="0"/>
+          <a:chOff x="0" y="0"/>
+          <a:chExt cx="0" cy="0"/>
+        </a:xfrm>
+      </p:grpSpPr>
+      <p:sp>
+        <p:nvSpPr>
+          <p:cNvPr id="4" name="Title 1">
+            <a:extLst>
+              <a:ext uri="{FF2B5EF4-FFF2-40B4-BE49-F238E27FC236}">
+                <a16:creationId xmlns:a16="http://schemas.microsoft.com/office/drawing/2014/main" id="{F01CE361-3908-4010-8031-51EEC67FB2EE}"/>
+              </a:ext>
+            </a:extLst>
+          </p:cNvPr>
+          <p:cNvSpPr>
+            <a:spLocks noGrp="1"/>
+          </p:cNvSpPr>
+          <p:nvPr>
+            <p:ph type="title"/>
+          </p:nvPr>
+        </p:nvSpPr>
+        <p:spPr>
+          <a:xfrm>
+            <a:off x="868317" y="240774"/>
+            <a:ext cx="10058400" cy="652957"/>
+          </a:xfrm>
+        </p:spPr>
+        <p:txBody>
+          <a:bodyPr>
+            <a:normAutofit fontScale="90000"/>
+          </a:bodyPr>
+          <a:lstStyle/>
+          <a:p>
+            <a:r>
+              <a:rPr lang="en-US" dirty="0">
+                <a:solidFill>
+                  <a:schemeClr val="tx1"/>
+                </a:solidFill>
+              </a:rPr>
+              <a:t>Future Work (1)</a:t>
+            </a:r>
+          </a:p>
+        </p:txBody>
+      </p:sp>
+      <p:cxnSp>
+        <p:nvCxnSpPr>
+          <p:cNvPr id="5" name="Straight Connector 4">
+            <a:extLst>
+              <a:ext uri="{FF2B5EF4-FFF2-40B4-BE49-F238E27FC236}">
+                <a16:creationId xmlns:a16="http://schemas.microsoft.com/office/drawing/2014/main" id="{397F0993-A969-411E-B5EA-2BA8489BE646}"/>
+              </a:ext>
+            </a:extLst>
+          </p:cNvPr>
+          <p:cNvCxnSpPr/>
+          <p:nvPr/>
+        </p:nvCxnSpPr>
+        <p:spPr>
+          <a:xfrm>
+            <a:off x="0" y="696286"/>
+            <a:ext cx="12192000" cy="0"/>
+          </a:xfrm>
+          <a:prstGeom prst="line">
+            <a:avLst/>
+          </a:prstGeom>
+        </p:spPr>
+        <p:style>
+          <a:lnRef idx="1">
+            <a:schemeClr val="accent1"/>
+          </a:lnRef>
+          <a:fillRef idx="0">
+            <a:schemeClr val="accent1"/>
+          </a:fillRef>
+          <a:effectRef idx="0">
+            <a:schemeClr val="accent1"/>
+          </a:effectRef>
+          <a:fontRef idx="minor">
+            <a:schemeClr val="tx1"/>
+          </a:fontRef>
+        </p:style>
+      </p:cxnSp>
+      <p:sp>
+        <p:nvSpPr>
+          <p:cNvPr id="7" name="Rectangle 6">
+            <a:extLst>
+              <a:ext uri="{FF2B5EF4-FFF2-40B4-BE49-F238E27FC236}">
+                <a16:creationId xmlns:a16="http://schemas.microsoft.com/office/drawing/2014/main" id="{E148745F-1186-40E6-845C-5C3836243D7C}"/>
+              </a:ext>
+            </a:extLst>
+          </p:cNvPr>
+          <p:cNvSpPr/>
+          <p:nvPr/>
+        </p:nvSpPr>
+        <p:spPr>
+          <a:xfrm>
+            <a:off x="0" y="1485900"/>
+            <a:ext cx="12192000" cy="261257"/>
+          </a:xfrm>
+          <a:prstGeom prst="rect">
+            <a:avLst/>
+          </a:prstGeom>
+          <a:solidFill>
+            <a:schemeClr val="bg1"/>
+          </a:solidFill>
+          <a:ln>
+            <a:noFill/>
+          </a:ln>
+        </p:spPr>
+        <p:style>
+          <a:lnRef idx="2">
+            <a:schemeClr val="accent1">
+              <a:shade val="50000"/>
+            </a:schemeClr>
+          </a:lnRef>
+          <a:fillRef idx="1">
+            <a:schemeClr val="accent1"/>
+          </a:fillRef>
+          <a:effectRef idx="0">
+            <a:schemeClr val="accent1"/>
+          </a:effectRef>
+          <a:fontRef idx="minor">
+            <a:schemeClr val="lt1"/>
+          </a:fontRef>
+        </p:style>
+        <p:txBody>
+          <a:bodyPr rtlCol="0" anchor="ctr"/>
+          <a:lstStyle/>
+          <a:p>
+            <a:pPr algn="ctr"/>
+            <a:endParaRPr lang="en-US"/>
+          </a:p>
+        </p:txBody>
+      </p:sp>
+      <p:cxnSp>
+        <p:nvCxnSpPr>
+          <p:cNvPr id="6" name="Straight Connector 5">
+            <a:extLst>
+              <a:ext uri="{FF2B5EF4-FFF2-40B4-BE49-F238E27FC236}">
+                <a16:creationId xmlns:a16="http://schemas.microsoft.com/office/drawing/2014/main" id="{CB1627D8-9799-419F-9DEB-585790B32D06}"/>
+              </a:ext>
+            </a:extLst>
+          </p:cNvPr>
+          <p:cNvCxnSpPr/>
+          <p:nvPr/>
+        </p:nvCxnSpPr>
+        <p:spPr>
+          <a:xfrm>
+            <a:off x="998290" y="0"/>
+            <a:ext cx="0" cy="6858000"/>
+          </a:xfrm>
+          <a:prstGeom prst="line">
+            <a:avLst/>
+          </a:prstGeom>
+        </p:spPr>
+        <p:style>
+          <a:lnRef idx="1">
+            <a:schemeClr val="accent1"/>
+          </a:lnRef>
+          <a:fillRef idx="0">
+            <a:schemeClr val="accent1"/>
+          </a:fillRef>
+          <a:effectRef idx="0">
+            <a:schemeClr val="accent1"/>
+          </a:effectRef>
+          <a:fontRef idx="minor">
+            <a:schemeClr val="tx1"/>
+          </a:fontRef>
+        </p:style>
+      </p:cxnSp>
+      <p:sp>
+        <p:nvSpPr>
+          <p:cNvPr id="3" name="Content Placeholder 2">
+            <a:extLst>
+              <a:ext uri="{FF2B5EF4-FFF2-40B4-BE49-F238E27FC236}">
+                <a16:creationId xmlns:a16="http://schemas.microsoft.com/office/drawing/2014/main" id="{6A45E749-7205-4B92-BB0A-A63BFEAD4444}"/>
+              </a:ext>
+            </a:extLst>
+          </p:cNvPr>
+          <p:cNvSpPr>
+            <a:spLocks noGrp="1"/>
+          </p:cNvSpPr>
+          <p:nvPr>
+            <p:ph idx="1"/>
+          </p:nvPr>
+        </p:nvSpPr>
+        <p:spPr>
+          <a:xfrm>
+            <a:off x="1267390" y="1087484"/>
+            <a:ext cx="3497649" cy="4023360"/>
+          </a:xfrm>
+        </p:spPr>
+        <p:txBody>
+          <a:bodyPr>
+            <a:normAutofit/>
+          </a:bodyPr>
+          <a:lstStyle/>
+          <a:p>
+            <a:pPr>
+              <a:buFont typeface="Arial" panose="020B0604020202020204" pitchFamily="34" charset="0"/>
+              <a:buChar char="•"/>
+            </a:pPr>
+            <a:r>
+              <a:rPr lang="en-US" sz="2800" dirty="0"/>
+              <a:t>  Analysis of full telemetry set</a:t>
+            </a:r>
+          </a:p>
+        </p:txBody>
+      </p:sp>
+      <p:pic>
+        <p:nvPicPr>
+          <p:cNvPr id="2" name="Picture 1">
+            <a:extLst>
+              <a:ext uri="{FF2B5EF4-FFF2-40B4-BE49-F238E27FC236}">
+                <a16:creationId xmlns:a16="http://schemas.microsoft.com/office/drawing/2014/main" id="{227517D4-EFD2-436E-81CC-40549BADDC9C}"/>
+              </a:ext>
+            </a:extLst>
+          </p:cNvPr>
+          <p:cNvPicPr>
+            <a:picLocks noChangeAspect="1"/>
+          </p:cNvPicPr>
+          <p:nvPr/>
+        </p:nvPicPr>
+        <p:blipFill rotWithShape="1">
+          <a:blip r:embed="rId2" cstate="screen">
+            <a:extLst>
+              <a:ext uri="{28A0092B-C50C-407E-A947-70E740481C1C}">
+                <a14:useLocalDpi xmlns:a14="http://schemas.microsoft.com/office/drawing/2010/main"/>
+              </a:ext>
+            </a:extLst>
+          </a:blip>
+          <a:srcRect/>
+          <a:stretch/>
+        </p:blipFill>
+        <p:spPr>
+          <a:xfrm>
+            <a:off x="6378125" y="858884"/>
+            <a:ext cx="5557042" cy="5409836"/>
+          </a:xfrm>
+          <a:prstGeom prst="rect">
+            <a:avLst/>
+          </a:prstGeom>
+        </p:spPr>
+      </p:pic>
+    </p:spTree>
+    <p:extLst>
+      <p:ext uri="{BB962C8B-B14F-4D97-AF65-F5344CB8AC3E}">
+        <p14:creationId xmlns:p14="http://schemas.microsoft.com/office/powerpoint/2010/main" val="1133648635"/>
+      </p:ext>
+    </p:extLst>
+  </p:cSld>
+  <p:clrMapOvr>
+    <a:masterClrMapping/>
+  </p:clrMapOvr>
+</p:sld>
+</file>
+
+<file path=ppt/slides/slide11.xml><?xml version="1.0" encoding="utf-8"?>
+<p:sld xmlns:a="http://schemas.openxmlformats.org/drawingml/2006/main" xmlns:r="http://schemas.openxmlformats.org/officeDocument/2006/relationships" xmlns:p="http://schemas.openxmlformats.org/presentationml/2006/main">
+  <p:cSld>
+    <p:spTree>
+      <p:nvGrpSpPr>
+        <p:cNvPr id="1" name=""/>
+        <p:cNvGrpSpPr/>
+        <p:nvPr/>
+      </p:nvGrpSpPr>
+      <p:grpSpPr>
+        <a:xfrm>
+          <a:off x="0" y="0"/>
+          <a:ext cx="0" cy="0"/>
+          <a:chOff x="0" y="0"/>
+          <a:chExt cx="0" cy="0"/>
+        </a:xfrm>
+      </p:grpSpPr>
+      <p:sp>
+        <p:nvSpPr>
+          <p:cNvPr id="6" name="Title 1">
+            <a:extLst>
+              <a:ext uri="{FF2B5EF4-FFF2-40B4-BE49-F238E27FC236}">
+                <a16:creationId xmlns:a16="http://schemas.microsoft.com/office/drawing/2014/main" id="{1DCBAEC9-CFD2-4D5B-8C00-467043C5CAF6}"/>
+              </a:ext>
+            </a:extLst>
+          </p:cNvPr>
+          <p:cNvSpPr>
+            <a:spLocks noGrp="1"/>
+          </p:cNvSpPr>
+          <p:nvPr>
+            <p:ph type="title"/>
+          </p:nvPr>
+        </p:nvSpPr>
+        <p:spPr>
+          <a:xfrm>
+            <a:off x="870568" y="198904"/>
+            <a:ext cx="10058400" cy="685800"/>
+          </a:xfrm>
+        </p:spPr>
+        <p:txBody>
+          <a:bodyPr>
+            <a:normAutofit fontScale="90000"/>
+          </a:bodyPr>
+          <a:lstStyle/>
+          <a:p>
+            <a:r>
+              <a:rPr lang="en-US" dirty="0"/>
+              <a:t>Future Work (2)</a:t>
+            </a:r>
+            <a:endParaRPr lang="en-US" baseline="30000" dirty="0"/>
+          </a:p>
+        </p:txBody>
+      </p:sp>
+      <p:sp>
+        <p:nvSpPr>
+          <p:cNvPr id="7" name="Rectangle 6">
+            <a:extLst>
+              <a:ext uri="{FF2B5EF4-FFF2-40B4-BE49-F238E27FC236}">
+                <a16:creationId xmlns:a16="http://schemas.microsoft.com/office/drawing/2014/main" id="{133D6C06-E59C-43A0-B3C4-397749D1CD46}"/>
+              </a:ext>
+            </a:extLst>
+          </p:cNvPr>
+          <p:cNvSpPr/>
+          <p:nvPr/>
+        </p:nvSpPr>
+        <p:spPr>
+          <a:xfrm>
+            <a:off x="0" y="1485900"/>
+            <a:ext cx="12192000" cy="261257"/>
+          </a:xfrm>
+          <a:prstGeom prst="rect">
+            <a:avLst/>
+          </a:prstGeom>
+          <a:solidFill>
+            <a:schemeClr val="bg1"/>
+          </a:solidFill>
+          <a:ln>
+            <a:noFill/>
+          </a:ln>
+        </p:spPr>
+        <p:style>
+          <a:lnRef idx="2">
+            <a:schemeClr val="accent1">
+              <a:shade val="50000"/>
+            </a:schemeClr>
+          </a:lnRef>
+          <a:fillRef idx="1">
+            <a:schemeClr val="accent1"/>
+          </a:fillRef>
+          <a:effectRef idx="0">
+            <a:schemeClr val="accent1"/>
+          </a:effectRef>
+          <a:fontRef idx="minor">
+            <a:schemeClr val="lt1"/>
+          </a:fontRef>
+        </p:style>
+        <p:txBody>
+          <a:bodyPr rtlCol="0" anchor="ctr"/>
+          <a:lstStyle/>
+          <a:p>
+            <a:pPr algn="ctr"/>
+            <a:endParaRPr lang="en-US"/>
+          </a:p>
+        </p:txBody>
+      </p:sp>
+      <p:pic>
+        <p:nvPicPr>
+          <p:cNvPr id="5" name="Content Placeholder 4" descr="Graphical user interface, text, application, chat or text message&#10;&#10;Description automatically generated">
+            <a:extLst>
+              <a:ext uri="{FF2B5EF4-FFF2-40B4-BE49-F238E27FC236}">
+                <a16:creationId xmlns:a16="http://schemas.microsoft.com/office/drawing/2014/main" id="{00993A35-0F9C-4BCA-948D-516722DD7C3B}"/>
+              </a:ext>
+            </a:extLst>
+          </p:cNvPr>
+          <p:cNvPicPr>
+            <a:picLocks noGrp="1" noChangeAspect="1"/>
+          </p:cNvPicPr>
+          <p:nvPr>
+            <p:ph idx="1"/>
+          </p:nvPr>
+        </p:nvPicPr>
+        <p:blipFill>
+          <a:blip r:embed="rId2">
+            <a:extLst>
+              <a:ext uri="{28A0092B-C50C-407E-A947-70E740481C1C}">
+                <a14:useLocalDpi xmlns:a14="http://schemas.microsoft.com/office/drawing/2010/main" val="0"/>
+              </a:ext>
+            </a:extLst>
+          </a:blip>
+          <a:stretch>
+            <a:fillRect/>
+          </a:stretch>
+        </p:blipFill>
+        <p:spPr>
+          <a:xfrm>
+            <a:off x="1607772" y="2396711"/>
+            <a:ext cx="8976456" cy="3811735"/>
+          </a:xfrm>
+        </p:spPr>
+      </p:pic>
+      <p:cxnSp>
+        <p:nvCxnSpPr>
+          <p:cNvPr id="8" name="Straight Connector 7">
+            <a:extLst>
+              <a:ext uri="{FF2B5EF4-FFF2-40B4-BE49-F238E27FC236}">
+                <a16:creationId xmlns:a16="http://schemas.microsoft.com/office/drawing/2014/main" id="{0F76DE88-3076-4131-BB67-807933EEB12B}"/>
+              </a:ext>
+            </a:extLst>
+          </p:cNvPr>
+          <p:cNvCxnSpPr/>
+          <p:nvPr/>
+        </p:nvCxnSpPr>
+        <p:spPr>
+          <a:xfrm>
+            <a:off x="0" y="696286"/>
+            <a:ext cx="12192000" cy="0"/>
+          </a:xfrm>
+          <a:prstGeom prst="line">
+            <a:avLst/>
+          </a:prstGeom>
+        </p:spPr>
+        <p:style>
+          <a:lnRef idx="1">
+            <a:schemeClr val="accent1"/>
+          </a:lnRef>
+          <a:fillRef idx="0">
+            <a:schemeClr val="accent1"/>
+          </a:fillRef>
+          <a:effectRef idx="0">
+            <a:schemeClr val="accent1"/>
+          </a:effectRef>
+          <a:fontRef idx="minor">
+            <a:schemeClr val="tx1"/>
+          </a:fontRef>
+        </p:style>
+      </p:cxnSp>
+      <p:cxnSp>
+        <p:nvCxnSpPr>
+          <p:cNvPr id="9" name="Straight Connector 8">
+            <a:extLst>
+              <a:ext uri="{FF2B5EF4-FFF2-40B4-BE49-F238E27FC236}">
+                <a16:creationId xmlns:a16="http://schemas.microsoft.com/office/drawing/2014/main" id="{8826308A-67A4-4FA1-8B58-ED1668B11AF0}"/>
+              </a:ext>
+            </a:extLst>
+          </p:cNvPr>
+          <p:cNvCxnSpPr/>
+          <p:nvPr/>
+        </p:nvCxnSpPr>
+        <p:spPr>
+          <a:xfrm>
+            <a:off x="998290" y="0"/>
+            <a:ext cx="0" cy="6858000"/>
+          </a:xfrm>
+          <a:prstGeom prst="line">
+            <a:avLst/>
+          </a:prstGeom>
+        </p:spPr>
+        <p:style>
+          <a:lnRef idx="1">
+            <a:schemeClr val="accent1"/>
+          </a:lnRef>
+          <a:fillRef idx="0">
+            <a:schemeClr val="accent1"/>
+          </a:fillRef>
+          <a:effectRef idx="0">
+            <a:schemeClr val="accent1"/>
+          </a:effectRef>
+          <a:fontRef idx="minor">
+            <a:schemeClr val="tx1"/>
+          </a:fontRef>
+        </p:style>
+      </p:cxnSp>
+      <p:sp>
+        <p:nvSpPr>
+          <p:cNvPr id="10" name="Content Placeholder 9">
+            <a:extLst>
+              <a:ext uri="{FF2B5EF4-FFF2-40B4-BE49-F238E27FC236}">
+                <a16:creationId xmlns:a16="http://schemas.microsoft.com/office/drawing/2014/main" id="{76EF0E12-D05E-4A93-AB42-1D08DDE87CF6}"/>
+              </a:ext>
+            </a:extLst>
+          </p:cNvPr>
+          <p:cNvSpPr txBox="1">
+            <a:spLocks/>
+          </p:cNvSpPr>
+          <p:nvPr/>
+        </p:nvSpPr>
+        <p:spPr>
+          <a:xfrm>
+            <a:off x="1126013" y="970148"/>
+            <a:ext cx="8371837" cy="1031371"/>
+          </a:xfrm>
+          <a:prstGeom prst="rect">
+            <a:avLst/>
+          </a:prstGeom>
+        </p:spPr>
+        <p:txBody>
+          <a:bodyPr vert="horz" lIns="0" tIns="45720" rIns="0" bIns="45720" rtlCol="0">
+            <a:normAutofit lnSpcReduction="10000"/>
+          </a:bodyPr>
+          <a:lstStyle>
+            <a:lvl1pPr marL="91440" indent="-91440" algn="l" defTabSz="914400" rtl="0" eaLnBrk="1" latinLnBrk="0" hangingPunct="1">
+              <a:lnSpc>
+                <a:spcPct val="90000"/>
+              </a:lnSpc>
+              <a:spcBef>
+                <a:spcPts val="1200"/>
+              </a:spcBef>
+              <a:spcAft>
+                <a:spcPts val="200"/>
+              </a:spcAft>
+              <a:buClr>
+                <a:schemeClr val="accent1"/>
+              </a:buClr>
+              <a:buSzPct val="100000"/>
+              <a:buFont typeface="Calibri" panose="020F0502020204030204" pitchFamily="34" charset="0"/>
+              <a:buChar char=" "/>
+              <a:defRPr sz="2000" kern="1200">
+                <a:solidFill>
+                  <a:schemeClr val="tx1">
+                    <a:lumMod val="75000"/>
+                    <a:lumOff val="25000"/>
+                  </a:schemeClr>
+                </a:solidFill>
+                <a:latin typeface="+mn-lt"/>
+                <a:ea typeface="+mn-ea"/>
+                <a:cs typeface="+mn-cs"/>
+              </a:defRPr>
+            </a:lvl1pPr>
+            <a:lvl2pPr marL="384048" indent="-182880" algn="l" defTabSz="914400" rtl="0" eaLnBrk="1" latinLnBrk="0" hangingPunct="1">
+              <a:lnSpc>
+                <a:spcPct val="90000"/>
+              </a:lnSpc>
+              <a:spcBef>
+                <a:spcPts val="200"/>
+              </a:spcBef>
+              <a:spcAft>
+                <a:spcPts val="400"/>
+              </a:spcAft>
+              <a:buClr>
+                <a:schemeClr val="accent1"/>
+              </a:buClr>
+              <a:buFont typeface="Calibri" pitchFamily="34" charset="0"/>
+              <a:buChar char="◦"/>
+              <a:defRPr sz="1800" kern="1200">
+                <a:solidFill>
+                  <a:schemeClr val="tx1">
+                    <a:lumMod val="75000"/>
+                    <a:lumOff val="25000"/>
+                  </a:schemeClr>
+                </a:solidFill>
+                <a:latin typeface="+mn-lt"/>
+                <a:ea typeface="+mn-ea"/>
+                <a:cs typeface="+mn-cs"/>
+              </a:defRPr>
+            </a:lvl2pPr>
+            <a:lvl3pPr marL="566928" indent="-182880" algn="l" defTabSz="914400" rtl="0" eaLnBrk="1" latinLnBrk="0" hangingPunct="1">
+              <a:lnSpc>
+                <a:spcPct val="90000"/>
+              </a:lnSpc>
+              <a:spcBef>
+                <a:spcPts val="200"/>
+              </a:spcBef>
+              <a:spcAft>
+                <a:spcPts val="400"/>
+              </a:spcAft>
+              <a:buClr>
+                <a:schemeClr val="accent1"/>
+              </a:buClr>
+              <a:buFont typeface="Calibri" pitchFamily="34" charset="0"/>
+              <a:buChar char="◦"/>
+              <a:defRPr sz="1400" kern="1200">
+                <a:solidFill>
+                  <a:schemeClr val="tx1">
+                    <a:lumMod val="75000"/>
+                    <a:lumOff val="25000"/>
+                  </a:schemeClr>
+                </a:solidFill>
+                <a:latin typeface="+mn-lt"/>
+                <a:ea typeface="+mn-ea"/>
+                <a:cs typeface="+mn-cs"/>
+              </a:defRPr>
+            </a:lvl3pPr>
+            <a:lvl4pPr marL="749808" indent="-182880" algn="l" defTabSz="914400" rtl="0" eaLnBrk="1" latinLnBrk="0" hangingPunct="1">
+              <a:lnSpc>
+                <a:spcPct val="90000"/>
+              </a:lnSpc>
+              <a:spcBef>
+                <a:spcPts val="200"/>
+              </a:spcBef>
+              <a:spcAft>
+                <a:spcPts val="400"/>
+              </a:spcAft>
+              <a:buClr>
+                <a:schemeClr val="accent1"/>
+              </a:buClr>
+              <a:buFont typeface="Calibri" pitchFamily="34" charset="0"/>
+              <a:buChar char="◦"/>
+              <a:defRPr sz="1400" kern="1200">
+                <a:solidFill>
+                  <a:schemeClr val="tx1">
+                    <a:lumMod val="75000"/>
+                    <a:lumOff val="25000"/>
+                  </a:schemeClr>
+                </a:solidFill>
+                <a:latin typeface="+mn-lt"/>
+                <a:ea typeface="+mn-ea"/>
+                <a:cs typeface="+mn-cs"/>
+              </a:defRPr>
+            </a:lvl4pPr>
+            <a:lvl5pPr marL="932688" indent="-182880" algn="l" defTabSz="914400" rtl="0" eaLnBrk="1" latinLnBrk="0" hangingPunct="1">
+              <a:lnSpc>
+                <a:spcPct val="90000"/>
+              </a:lnSpc>
+              <a:spcBef>
+                <a:spcPts val="200"/>
+              </a:spcBef>
+              <a:spcAft>
+                <a:spcPts val="400"/>
+              </a:spcAft>
+              <a:buClr>
+                <a:schemeClr val="accent1"/>
+              </a:buClr>
+              <a:buFont typeface="Calibri" pitchFamily="34" charset="0"/>
+              <a:buChar char="◦"/>
+              <a:defRPr sz="1400" kern="1200">
+                <a:solidFill>
+                  <a:schemeClr val="tx1">
+                    <a:lumMod val="75000"/>
+                    <a:lumOff val="25000"/>
+                  </a:schemeClr>
+                </a:solidFill>
+                <a:latin typeface="+mn-lt"/>
+                <a:ea typeface="+mn-ea"/>
+                <a:cs typeface="+mn-cs"/>
+              </a:defRPr>
+            </a:lvl5pPr>
+            <a:lvl6pPr marL="1100000" indent="-228600" algn="l" defTabSz="914400" rtl="0" eaLnBrk="1" latinLnBrk="0" hangingPunct="1">
+              <a:lnSpc>
+                <a:spcPct val="90000"/>
+              </a:lnSpc>
+              <a:spcBef>
+                <a:spcPts val="200"/>
+              </a:spcBef>
+              <a:spcAft>
+                <a:spcPts val="400"/>
+              </a:spcAft>
+              <a:buClr>
+                <a:schemeClr val="accent1"/>
+              </a:buClr>
+              <a:buFont typeface="Calibri" pitchFamily="34" charset="0"/>
+              <a:buChar char="◦"/>
+              <a:defRPr sz="1400" kern="1200">
+                <a:solidFill>
+                  <a:schemeClr val="tx1">
+                    <a:lumMod val="75000"/>
+                    <a:lumOff val="25000"/>
+                  </a:schemeClr>
+                </a:solidFill>
+                <a:latin typeface="+mn-lt"/>
+                <a:ea typeface="+mn-ea"/>
+                <a:cs typeface="+mn-cs"/>
+              </a:defRPr>
+            </a:lvl6pPr>
+            <a:lvl7pPr marL="1300000" indent="-228600" algn="l" defTabSz="914400" rtl="0" eaLnBrk="1" latinLnBrk="0" hangingPunct="1">
+              <a:lnSpc>
+                <a:spcPct val="90000"/>
+              </a:lnSpc>
+              <a:spcBef>
+                <a:spcPts val="200"/>
+              </a:spcBef>
+              <a:spcAft>
+                <a:spcPts val="400"/>
+              </a:spcAft>
+              <a:buClr>
+                <a:schemeClr val="accent1"/>
+              </a:buClr>
+              <a:buFont typeface="Calibri" pitchFamily="34" charset="0"/>
+              <a:buChar char="◦"/>
+              <a:defRPr sz="1400" kern="1200">
+                <a:solidFill>
+                  <a:schemeClr val="tx1">
+                    <a:lumMod val="75000"/>
+                    <a:lumOff val="25000"/>
+                  </a:schemeClr>
+                </a:solidFill>
+                <a:latin typeface="+mn-lt"/>
+                <a:ea typeface="+mn-ea"/>
+                <a:cs typeface="+mn-cs"/>
+              </a:defRPr>
+            </a:lvl7pPr>
+            <a:lvl8pPr marL="1500000" indent="-228600" algn="l" defTabSz="914400" rtl="0" eaLnBrk="1" latinLnBrk="0" hangingPunct="1">
+              <a:lnSpc>
+                <a:spcPct val="90000"/>
+              </a:lnSpc>
+              <a:spcBef>
+                <a:spcPts val="200"/>
+              </a:spcBef>
+              <a:spcAft>
+                <a:spcPts val="400"/>
+              </a:spcAft>
+              <a:buClr>
+                <a:schemeClr val="accent1"/>
+              </a:buClr>
+              <a:buFont typeface="Calibri" pitchFamily="34" charset="0"/>
+              <a:buChar char="◦"/>
+              <a:defRPr sz="1400" kern="1200">
+                <a:solidFill>
+                  <a:schemeClr val="tx1">
+                    <a:lumMod val="75000"/>
+                    <a:lumOff val="25000"/>
+                  </a:schemeClr>
+                </a:solidFill>
+                <a:latin typeface="+mn-lt"/>
+                <a:ea typeface="+mn-ea"/>
+                <a:cs typeface="+mn-cs"/>
+              </a:defRPr>
+            </a:lvl8pPr>
+            <a:lvl9pPr marL="1700000" indent="-228600" algn="l" defTabSz="914400" rtl="0" eaLnBrk="1" latinLnBrk="0" hangingPunct="1">
+              <a:lnSpc>
+                <a:spcPct val="90000"/>
+              </a:lnSpc>
+              <a:spcBef>
+                <a:spcPts val="200"/>
+              </a:spcBef>
+              <a:spcAft>
+                <a:spcPts val="400"/>
+              </a:spcAft>
+              <a:buClr>
+                <a:schemeClr val="accent1"/>
+              </a:buClr>
+              <a:buFont typeface="Calibri" pitchFamily="34" charset="0"/>
+              <a:buChar char="◦"/>
+              <a:defRPr sz="1400" kern="1200">
+                <a:solidFill>
+                  <a:schemeClr val="tx1">
+                    <a:lumMod val="75000"/>
+                    <a:lumOff val="25000"/>
+                  </a:schemeClr>
+                </a:solidFill>
+                <a:latin typeface="+mn-lt"/>
+                <a:ea typeface="+mn-ea"/>
+                <a:cs typeface="+mn-cs"/>
+              </a:defRPr>
+            </a:lvl9pPr>
+          </a:lstStyle>
+          <a:p>
+            <a:pPr>
+              <a:buFont typeface="Arial" panose="020B0604020202020204" pitchFamily="34" charset="0"/>
+              <a:buChar char="•"/>
+            </a:pPr>
+            <a:r>
+              <a:rPr lang="en-US" sz="2800" dirty="0"/>
+              <a:t>  Application to real CubeSat project</a:t>
+            </a:r>
+          </a:p>
+          <a:p>
+            <a:pPr>
+              <a:buFont typeface="Arial" panose="020B0604020202020204" pitchFamily="34" charset="0"/>
+              <a:buChar char="•"/>
+            </a:pPr>
+            <a:r>
+              <a:rPr lang="en-US" sz="2800" dirty="0"/>
+              <a:t>  Explore benefits of embedding RV on the CubeSat</a:t>
+            </a:r>
+          </a:p>
+        </p:txBody>
+      </p:sp>
+    </p:spTree>
+    <p:extLst>
+      <p:ext uri="{BB962C8B-B14F-4D97-AF65-F5344CB8AC3E}">
+        <p14:creationId xmlns:p14="http://schemas.microsoft.com/office/powerpoint/2010/main" val="864525112"/>
+      </p:ext>
+    </p:extLst>
+  </p:cSld>
+  <p:clrMapOvr>
+    <a:masterClrMapping/>
+  </p:clrMapOvr>
+</p:sld>
+</file>
+
 <file path=ppt/slides/slide2.xml><?xml version="1.0" encoding="utf-8"?>
 <p:sld xmlns:a="http://schemas.openxmlformats.org/drawingml/2006/main" xmlns:r="http://schemas.openxmlformats.org/officeDocument/2006/relationships" xmlns:p="http://schemas.openxmlformats.org/presentationml/2006/main">
   <p:cSld>
@@ -3991,6 +4782,268 @@
           <p:cNvPr id="2" name="Title 1">
             <a:extLst>
               <a:ext uri="{FF2B5EF4-FFF2-40B4-BE49-F238E27FC236}">
+                <a16:creationId xmlns:a16="http://schemas.microsoft.com/office/drawing/2014/main" id="{C3BBA8C6-8987-4F9B-954C-AEE5EB90F55F}"/>
+              </a:ext>
+            </a:extLst>
+          </p:cNvPr>
+          <p:cNvSpPr>
+            <a:spLocks noGrp="1"/>
+          </p:cNvSpPr>
+          <p:nvPr>
+            <p:ph type="title"/>
+          </p:nvPr>
+        </p:nvSpPr>
+        <p:spPr>
+          <a:xfrm>
+            <a:off x="889628" y="230614"/>
+            <a:ext cx="10058400" cy="652957"/>
+          </a:xfrm>
+        </p:spPr>
+        <p:txBody>
+          <a:bodyPr>
+            <a:normAutofit fontScale="90000"/>
+          </a:bodyPr>
+          <a:lstStyle/>
+          <a:p>
+            <a:r>
+              <a:rPr lang="en-US" dirty="0">
+                <a:solidFill>
+                  <a:schemeClr val="tx1"/>
+                </a:solidFill>
+              </a:rPr>
+              <a:t>Contributions</a:t>
+            </a:r>
+          </a:p>
+        </p:txBody>
+      </p:sp>
+      <p:sp>
+        <p:nvSpPr>
+          <p:cNvPr id="4" name="Rectangle 3">
+            <a:extLst>
+              <a:ext uri="{FF2B5EF4-FFF2-40B4-BE49-F238E27FC236}">
+                <a16:creationId xmlns:a16="http://schemas.microsoft.com/office/drawing/2014/main" id="{FAC4B156-EDE6-47BC-B057-5268D00D99DC}"/>
+              </a:ext>
+            </a:extLst>
+          </p:cNvPr>
+          <p:cNvSpPr/>
+          <p:nvPr/>
+        </p:nvSpPr>
+        <p:spPr>
+          <a:xfrm>
+            <a:off x="0" y="1485900"/>
+            <a:ext cx="12192000" cy="261257"/>
+          </a:xfrm>
+          <a:prstGeom prst="rect">
+            <a:avLst/>
+          </a:prstGeom>
+          <a:solidFill>
+            <a:schemeClr val="bg1"/>
+          </a:solidFill>
+          <a:ln>
+            <a:noFill/>
+          </a:ln>
+        </p:spPr>
+        <p:style>
+          <a:lnRef idx="2">
+            <a:schemeClr val="accent1">
+              <a:shade val="50000"/>
+            </a:schemeClr>
+          </a:lnRef>
+          <a:fillRef idx="1">
+            <a:schemeClr val="accent1"/>
+          </a:fillRef>
+          <a:effectRef idx="0">
+            <a:schemeClr val="accent1"/>
+          </a:effectRef>
+          <a:fontRef idx="minor">
+            <a:schemeClr val="lt1"/>
+          </a:fontRef>
+        </p:style>
+        <p:txBody>
+          <a:bodyPr rtlCol="0" anchor="ctr"/>
+          <a:lstStyle/>
+          <a:p>
+            <a:pPr algn="ctr"/>
+            <a:endParaRPr lang="en-US"/>
+          </a:p>
+        </p:txBody>
+      </p:sp>
+      <p:cxnSp>
+        <p:nvCxnSpPr>
+          <p:cNvPr id="5" name="Straight Connector 4">
+            <a:extLst>
+              <a:ext uri="{FF2B5EF4-FFF2-40B4-BE49-F238E27FC236}">
+                <a16:creationId xmlns:a16="http://schemas.microsoft.com/office/drawing/2014/main" id="{852DE64C-1FCC-422C-810C-12578D28B28D}"/>
+              </a:ext>
+            </a:extLst>
+          </p:cNvPr>
+          <p:cNvCxnSpPr/>
+          <p:nvPr/>
+        </p:nvCxnSpPr>
+        <p:spPr>
+          <a:xfrm>
+            <a:off x="0" y="696286"/>
+            <a:ext cx="12192000" cy="0"/>
+          </a:xfrm>
+          <a:prstGeom prst="line">
+            <a:avLst/>
+          </a:prstGeom>
+        </p:spPr>
+        <p:style>
+          <a:lnRef idx="1">
+            <a:schemeClr val="accent1"/>
+          </a:lnRef>
+          <a:fillRef idx="0">
+            <a:schemeClr val="accent1"/>
+          </a:fillRef>
+          <a:effectRef idx="0">
+            <a:schemeClr val="accent1"/>
+          </a:effectRef>
+          <a:fontRef idx="minor">
+            <a:schemeClr val="tx1"/>
+          </a:fontRef>
+        </p:style>
+      </p:cxnSp>
+      <p:cxnSp>
+        <p:nvCxnSpPr>
+          <p:cNvPr id="6" name="Straight Connector 5">
+            <a:extLst>
+              <a:ext uri="{FF2B5EF4-FFF2-40B4-BE49-F238E27FC236}">
+                <a16:creationId xmlns:a16="http://schemas.microsoft.com/office/drawing/2014/main" id="{73168877-2FD4-412A-9927-7C792A1275C4}"/>
+              </a:ext>
+            </a:extLst>
+          </p:cNvPr>
+          <p:cNvCxnSpPr/>
+          <p:nvPr/>
+        </p:nvCxnSpPr>
+        <p:spPr>
+          <a:xfrm>
+            <a:off x="998290" y="0"/>
+            <a:ext cx="0" cy="6858000"/>
+          </a:xfrm>
+          <a:prstGeom prst="line">
+            <a:avLst/>
+          </a:prstGeom>
+        </p:spPr>
+        <p:style>
+          <a:lnRef idx="1">
+            <a:schemeClr val="accent1"/>
+          </a:lnRef>
+          <a:fillRef idx="0">
+            <a:schemeClr val="accent1"/>
+          </a:fillRef>
+          <a:effectRef idx="0">
+            <a:schemeClr val="accent1"/>
+          </a:effectRef>
+          <a:fontRef idx="minor">
+            <a:schemeClr val="tx1"/>
+          </a:fontRef>
+        </p:style>
+      </p:cxnSp>
+      <p:sp>
+        <p:nvSpPr>
+          <p:cNvPr id="3" name="Content Placeholder 2">
+            <a:extLst>
+              <a:ext uri="{FF2B5EF4-FFF2-40B4-BE49-F238E27FC236}">
+                <a16:creationId xmlns:a16="http://schemas.microsoft.com/office/drawing/2014/main" id="{B60BB100-6F98-472D-8D7F-68FE278100F1}"/>
+              </a:ext>
+            </a:extLst>
+          </p:cNvPr>
+          <p:cNvSpPr>
+            <a:spLocks noGrp="1"/>
+          </p:cNvSpPr>
+          <p:nvPr>
+            <p:ph idx="1"/>
+          </p:nvPr>
+        </p:nvSpPr>
+        <p:spPr>
+          <a:xfrm>
+            <a:off x="923081" y="1161959"/>
+            <a:ext cx="10058400" cy="3624943"/>
+          </a:xfrm>
+        </p:spPr>
+        <p:txBody>
+          <a:bodyPr>
+            <a:normAutofit/>
+          </a:bodyPr>
+          <a:lstStyle/>
+          <a:p>
+            <a:r>
+              <a:rPr lang="en-US" sz="2400" b="1" dirty="0"/>
+              <a:t>1)</a:t>
+            </a:r>
+            <a:r>
+              <a:rPr lang="en-US" sz="2400" dirty="0"/>
+              <a:t> We develop a reference set of formal specifications in mission-time linear temporal logic (MLTL) describing a modeled CubeSat communications system</a:t>
+            </a:r>
+          </a:p>
+          <a:p>
+            <a:r>
+              <a:rPr lang="en-US" sz="2400" b="1" dirty="0"/>
+              <a:t>2) </a:t>
+            </a:r>
+            <a:r>
+              <a:rPr lang="en-US" sz="2400" dirty="0"/>
+              <a:t>We detail our validation strategy over these specifications using experimental evaluation with the R2U2 tool</a:t>
+            </a:r>
+          </a:p>
+          <a:p>
+            <a:r>
+              <a:rPr lang="en-US" sz="2400" b="1" dirty="0"/>
+              <a:t>3) </a:t>
+            </a:r>
+            <a:r>
+              <a:rPr lang="en-US" sz="2400" dirty="0"/>
+              <a:t>We highlight and discuss specification patterns that emerge while developing and revising the specifications</a:t>
+            </a:r>
+          </a:p>
+          <a:p>
+            <a:r>
+              <a:rPr lang="en-US" sz="2400" b="1" dirty="0"/>
+              <a:t>4) </a:t>
+            </a:r>
+            <a:r>
+              <a:rPr lang="en-US" sz="2400" dirty="0"/>
+              <a:t>We discuss lessons learned from validating these specifications that may inform future CubeSat runtime verification efforts</a:t>
+            </a:r>
+          </a:p>
+        </p:txBody>
+      </p:sp>
+    </p:spTree>
+    <p:extLst>
+      <p:ext uri="{BB962C8B-B14F-4D97-AF65-F5344CB8AC3E}">
+        <p14:creationId xmlns:p14="http://schemas.microsoft.com/office/powerpoint/2010/main" val="1121272991"/>
+      </p:ext>
+    </p:extLst>
+  </p:cSld>
+  <p:clrMapOvr>
+    <a:masterClrMapping/>
+  </p:clrMapOvr>
+</p:sld>
+</file>
+
+<file path=ppt/slides/slide3.xml><?xml version="1.0" encoding="utf-8"?>
+<p:sld xmlns:a="http://schemas.openxmlformats.org/drawingml/2006/main" xmlns:r="http://schemas.openxmlformats.org/officeDocument/2006/relationships" xmlns:p="http://schemas.openxmlformats.org/presentationml/2006/main">
+  <p:cSld>
+    <p:spTree>
+      <p:nvGrpSpPr>
+        <p:cNvPr id="1" name=""/>
+        <p:cNvGrpSpPr/>
+        <p:nvPr/>
+      </p:nvGrpSpPr>
+      <p:grpSpPr>
+        <a:xfrm>
+          <a:off x="0" y="0"/>
+          <a:ext cx="0" cy="0"/>
+          <a:chOff x="0" y="0"/>
+          <a:chExt cx="0" cy="0"/>
+        </a:xfrm>
+      </p:grpSpPr>
+      <p:sp>
+        <p:nvSpPr>
+          <p:cNvPr id="2" name="Title 1">
+            <a:extLst>
+              <a:ext uri="{FF2B5EF4-FFF2-40B4-BE49-F238E27FC236}">
                 <a16:creationId xmlns:a16="http://schemas.microsoft.com/office/drawing/2014/main" id="{173B74E5-9FE3-42D7-9EB9-C11A02B9132B}"/>
               </a:ext>
             </a:extLst>
@@ -4004,7 +5057,7 @@
         </p:nvSpPr>
         <p:spPr>
           <a:xfrm>
-            <a:off x="883990" y="124786"/>
+            <a:off x="883990" y="134946"/>
             <a:ext cx="10058400" cy="762021"/>
           </a:xfrm>
         </p:spPr>
@@ -4023,31 +5076,6 @@
               </a:rPr>
               <a:t>CubeSats</a:t>
             </a:r>
-          </a:p>
-        </p:txBody>
-      </p:sp>
-      <p:sp>
-        <p:nvSpPr>
-          <p:cNvPr id="3" name="Content Placeholder 2">
-            <a:extLst>
-              <a:ext uri="{FF2B5EF4-FFF2-40B4-BE49-F238E27FC236}">
-                <a16:creationId xmlns:a16="http://schemas.microsoft.com/office/drawing/2014/main" id="{D78DCCC1-FB32-4DF9-B359-1B54374475F8}"/>
-              </a:ext>
-            </a:extLst>
-          </p:cNvPr>
-          <p:cNvSpPr>
-            <a:spLocks noGrp="1"/>
-          </p:cNvSpPr>
-          <p:nvPr>
-            <p:ph idx="1"/>
-          </p:nvPr>
-        </p:nvSpPr>
-        <p:spPr/>
-        <p:txBody>
-          <a:bodyPr/>
-          <a:lstStyle/>
-          <a:p>
-            <a:endParaRPr lang="en-US" dirty="0"/>
           </a:p>
         </p:txBody>
       </p:sp>
@@ -4175,6 +5203,125 @@
           </a:fontRef>
         </p:style>
       </p:cxnSp>
+      <p:pic>
+        <p:nvPicPr>
+          <p:cNvPr id="13" name="Content Placeholder 11">
+            <a:extLst>
+              <a:ext uri="{FF2B5EF4-FFF2-40B4-BE49-F238E27FC236}">
+                <a16:creationId xmlns:a16="http://schemas.microsoft.com/office/drawing/2014/main" id="{404FC057-D9B2-4BA1-9D47-0C97F3DCEBEC}"/>
+              </a:ext>
+            </a:extLst>
+          </p:cNvPr>
+          <p:cNvPicPr>
+            <a:picLocks noChangeAspect="1"/>
+          </p:cNvPicPr>
+          <p:nvPr/>
+        </p:nvPicPr>
+        <p:blipFill rotWithShape="1">
+          <a:blip r:embed="rId2">
+            <a:extLst>
+              <a:ext uri="{28A0092B-C50C-407E-A947-70E740481C1C}">
+                <a14:useLocalDpi xmlns:a14="http://schemas.microsoft.com/office/drawing/2010/main" val="0"/>
+              </a:ext>
+            </a:extLst>
+          </a:blip>
+          <a:srcRect/>
+          <a:stretch/>
+        </p:blipFill>
+        <p:spPr>
+          <a:xfrm>
+            <a:off x="8263054" y="1747157"/>
+            <a:ext cx="2408663" cy="2914526"/>
+          </a:xfrm>
+          <a:prstGeom prst="rect">
+            <a:avLst/>
+          </a:prstGeom>
+        </p:spPr>
+      </p:pic>
+      <p:sp>
+        <p:nvSpPr>
+          <p:cNvPr id="3" name="Content Placeholder 2">
+            <a:extLst>
+              <a:ext uri="{FF2B5EF4-FFF2-40B4-BE49-F238E27FC236}">
+                <a16:creationId xmlns:a16="http://schemas.microsoft.com/office/drawing/2014/main" id="{D78DCCC1-FB32-4DF9-B359-1B54374475F8}"/>
+              </a:ext>
+            </a:extLst>
+          </p:cNvPr>
+          <p:cNvSpPr>
+            <a:spLocks noGrp="1"/>
+          </p:cNvSpPr>
+          <p:nvPr>
+            <p:ph idx="1"/>
+          </p:nvPr>
+        </p:nvSpPr>
+        <p:spPr>
+          <a:xfrm>
+            <a:off x="1243736" y="1087484"/>
+            <a:ext cx="6122259" cy="4896756"/>
+          </a:xfrm>
+        </p:spPr>
+        <p:txBody>
+          <a:bodyPr>
+            <a:normAutofit/>
+          </a:bodyPr>
+          <a:lstStyle/>
+          <a:p>
+            <a:pPr fontAlgn="base">
+              <a:lnSpc>
+                <a:spcPct val="100000"/>
+              </a:lnSpc>
+              <a:buFont typeface="Arial" panose="020B0604020202020204" pitchFamily="34" charset="0"/>
+              <a:buChar char="•"/>
+            </a:pPr>
+            <a:r>
+              <a:rPr lang="en-US" sz="2400" dirty="0"/>
+              <a:t>  CubeSats becoming widely used owing to their relatively low cost and fast turnaround times.</a:t>
+            </a:r>
+          </a:p>
+          <a:p>
+            <a:pPr fontAlgn="base">
+              <a:lnSpc>
+                <a:spcPct val="100000"/>
+              </a:lnSpc>
+              <a:buFont typeface="Arial" panose="020B0604020202020204" pitchFamily="34" charset="0"/>
+              <a:buChar char="•"/>
+            </a:pPr>
+            <a:r>
+              <a:rPr lang="en-US" sz="2400" dirty="0"/>
+              <a:t>  CubeSat communications systems are extremely important to any mission.</a:t>
+            </a:r>
+          </a:p>
+          <a:p>
+            <a:pPr fontAlgn="base">
+              <a:lnSpc>
+                <a:spcPct val="100000"/>
+              </a:lnSpc>
+              <a:buFont typeface="Arial" panose="020B0604020202020204" pitchFamily="34" charset="0"/>
+              <a:buChar char="•"/>
+            </a:pPr>
+            <a:r>
+              <a:rPr lang="en-US" sz="2400" dirty="0"/>
+              <a:t>  Communications system failures are one of the most common types of failures with CubeSat missions .</a:t>
+            </a:r>
+          </a:p>
+          <a:p>
+            <a:pPr fontAlgn="base">
+              <a:lnSpc>
+                <a:spcPct val="100000"/>
+              </a:lnSpc>
+              <a:buFont typeface="Arial" panose="020B0604020202020204" pitchFamily="34" charset="0"/>
+              <a:buChar char="•"/>
+            </a:pPr>
+            <a:r>
+              <a:rPr lang="en-US" sz="2400" dirty="0"/>
+              <a:t>  Formal methods are used to specify, develop and verify software and hardware systems, but despite failures being common, nobody has used the techniques with CubeSats.</a:t>
+            </a:r>
+          </a:p>
+          <a:p>
+            <a:endParaRPr lang="en-US" dirty="0"/>
+          </a:p>
+        </p:txBody>
+      </p:sp>
     </p:spTree>
     <p:extLst>
       <p:ext uri="{BB962C8B-B14F-4D97-AF65-F5344CB8AC3E}">
@@ -4188,7 +5335,442 @@
 </p:sld>
 </file>
 
-<file path=ppt/slides/slide3.xml><?xml version="1.0" encoding="utf-8"?>
+<file path=ppt/slides/slide4.xml><?xml version="1.0" encoding="utf-8"?>
+<p:sld xmlns:a="http://schemas.openxmlformats.org/drawingml/2006/main" xmlns:r="http://schemas.openxmlformats.org/officeDocument/2006/relationships" xmlns:p="http://schemas.openxmlformats.org/presentationml/2006/main">
+  <p:cSld>
+    <p:spTree>
+      <p:nvGrpSpPr>
+        <p:cNvPr id="1" name=""/>
+        <p:cNvGrpSpPr/>
+        <p:nvPr/>
+      </p:nvGrpSpPr>
+      <p:grpSpPr>
+        <a:xfrm>
+          <a:off x="0" y="0"/>
+          <a:ext cx="0" cy="0"/>
+          <a:chOff x="0" y="0"/>
+          <a:chExt cx="0" cy="0"/>
+        </a:xfrm>
+      </p:grpSpPr>
+      <p:sp>
+        <p:nvSpPr>
+          <p:cNvPr id="4" name="Title 1">
+            <a:extLst>
+              <a:ext uri="{FF2B5EF4-FFF2-40B4-BE49-F238E27FC236}">
+                <a16:creationId xmlns:a16="http://schemas.microsoft.com/office/drawing/2014/main" id="{2CFCF1F6-E26F-4763-8D05-21853A09EFBF}"/>
+              </a:ext>
+            </a:extLst>
+          </p:cNvPr>
+          <p:cNvSpPr>
+            <a:spLocks noGrp="1"/>
+          </p:cNvSpPr>
+          <p:nvPr>
+            <p:ph type="title"/>
+          </p:nvPr>
+        </p:nvSpPr>
+        <p:spPr>
+          <a:xfrm>
+            <a:off x="872761" y="181161"/>
+            <a:ext cx="10058401" cy="713522"/>
+          </a:xfrm>
+        </p:spPr>
+        <p:txBody>
+          <a:bodyPr>
+            <a:normAutofit fontScale="90000"/>
+          </a:bodyPr>
+          <a:lstStyle/>
+          <a:p>
+            <a:r>
+              <a:rPr lang="en-US" dirty="0"/>
+              <a:t>Mission-Bounded Linear Temporal Logic</a:t>
+            </a:r>
+            <a:r>
+              <a:rPr lang="en-US" baseline="30000" dirty="0"/>
+              <a:t>1</a:t>
+            </a:r>
+          </a:p>
+        </p:txBody>
+      </p:sp>
+      <p:sp>
+        <p:nvSpPr>
+          <p:cNvPr id="5" name="Rectangle 4">
+            <a:extLst>
+              <a:ext uri="{FF2B5EF4-FFF2-40B4-BE49-F238E27FC236}">
+                <a16:creationId xmlns:a16="http://schemas.microsoft.com/office/drawing/2014/main" id="{C1BFA22C-8BE9-4425-8F55-807A53F2C637}"/>
+              </a:ext>
+            </a:extLst>
+          </p:cNvPr>
+          <p:cNvSpPr/>
+          <p:nvPr/>
+        </p:nvSpPr>
+        <p:spPr>
+          <a:xfrm>
+            <a:off x="0" y="1485900"/>
+            <a:ext cx="12192000" cy="261257"/>
+          </a:xfrm>
+          <a:prstGeom prst="rect">
+            <a:avLst/>
+          </a:prstGeom>
+          <a:solidFill>
+            <a:schemeClr val="bg1"/>
+          </a:solidFill>
+          <a:ln>
+            <a:noFill/>
+          </a:ln>
+        </p:spPr>
+        <p:style>
+          <a:lnRef idx="2">
+            <a:schemeClr val="accent1">
+              <a:shade val="50000"/>
+            </a:schemeClr>
+          </a:lnRef>
+          <a:fillRef idx="1">
+            <a:schemeClr val="accent1"/>
+          </a:fillRef>
+          <a:effectRef idx="0">
+            <a:schemeClr val="accent1"/>
+          </a:effectRef>
+          <a:fontRef idx="minor">
+            <a:schemeClr val="lt1"/>
+          </a:fontRef>
+        </p:style>
+        <p:txBody>
+          <a:bodyPr rtlCol="0" anchor="ctr"/>
+          <a:lstStyle/>
+          <a:p>
+            <a:pPr algn="ctr"/>
+            <a:endParaRPr lang="en-US"/>
+          </a:p>
+        </p:txBody>
+      </p:sp>
+      <p:sp>
+        <p:nvSpPr>
+          <p:cNvPr id="3" name="Content Placeholder 2">
+            <a:extLst>
+              <a:ext uri="{FF2B5EF4-FFF2-40B4-BE49-F238E27FC236}">
+                <a16:creationId xmlns:a16="http://schemas.microsoft.com/office/drawing/2014/main" id="{2D04CCD1-563E-4627-8163-F2DD40EFEE03}"/>
+              </a:ext>
+            </a:extLst>
+          </p:cNvPr>
+          <p:cNvSpPr>
+            <a:spLocks noGrp="1"/>
+          </p:cNvSpPr>
+          <p:nvPr>
+            <p:ph idx="1"/>
+          </p:nvPr>
+        </p:nvSpPr>
+        <p:spPr>
+          <a:xfrm>
+            <a:off x="1097280" y="1160980"/>
+            <a:ext cx="10058400" cy="1736332"/>
+          </a:xfrm>
+        </p:spPr>
+        <p:txBody>
+          <a:bodyPr/>
+          <a:lstStyle/>
+          <a:p>
+            <a:pPr marL="0" indent="0">
+              <a:buNone/>
+            </a:pPr>
+            <a:r>
+              <a:rPr lang="en-US" dirty="0"/>
+              <a:t>Mission-Time Temporal Logic (MLTL) reasons about integer-bounded timelines:</a:t>
+            </a:r>
+          </a:p>
+          <a:p>
+            <a:pPr>
+              <a:buFont typeface="Arial" panose="020B0604020202020204" pitchFamily="34" charset="0"/>
+              <a:buChar char="•"/>
+            </a:pPr>
+            <a:r>
+              <a:rPr lang="en-US" dirty="0"/>
+              <a:t>  finite set of atomic propositions { p q }</a:t>
+            </a:r>
+          </a:p>
+          <a:p>
+            <a:pPr>
+              <a:buFont typeface="Arial" panose="020B0604020202020204" pitchFamily="34" charset="0"/>
+              <a:buChar char="•"/>
+            </a:pPr>
+            <a:r>
+              <a:rPr lang="en-US" dirty="0"/>
+              <a:t>  Boolean connectives: </a:t>
+            </a:r>
+          </a:p>
+          <a:p>
+            <a:pPr>
+              <a:buFont typeface="Arial" panose="020B0604020202020204" pitchFamily="34" charset="0"/>
+              <a:buChar char="•"/>
+            </a:pPr>
+            <a:r>
+              <a:rPr lang="en-US" dirty="0"/>
+              <a:t>  Temporal connectives with time bounds</a:t>
+            </a:r>
+          </a:p>
+        </p:txBody>
+      </p:sp>
+      <p:pic>
+        <p:nvPicPr>
+          <p:cNvPr id="6" name="Picture 5">
+            <a:extLst>
+              <a:ext uri="{FF2B5EF4-FFF2-40B4-BE49-F238E27FC236}">
+                <a16:creationId xmlns:a16="http://schemas.microsoft.com/office/drawing/2014/main" id="{1B7EA449-279E-40BD-96A8-4A4749F7EBC7}"/>
+              </a:ext>
+            </a:extLst>
+          </p:cNvPr>
+          <p:cNvPicPr>
+            <a:picLocks noChangeAspect="1"/>
+          </p:cNvPicPr>
+          <p:nvPr/>
+        </p:nvPicPr>
+        <p:blipFill rotWithShape="1">
+          <a:blip r:embed="rId2"/>
+          <a:srcRect l="4467" t="19326" r="5703" b="28689"/>
+          <a:stretch/>
+        </p:blipFill>
+        <p:spPr>
+          <a:xfrm>
+            <a:off x="1459861" y="2868737"/>
+            <a:ext cx="9157357" cy="2980866"/>
+          </a:xfrm>
+          <a:prstGeom prst="rect">
+            <a:avLst/>
+          </a:prstGeom>
+        </p:spPr>
+      </p:pic>
+      <p:sp>
+        <p:nvSpPr>
+          <p:cNvPr id="7" name="Rectangle 6">
+            <a:extLst>
+              <a:ext uri="{FF2B5EF4-FFF2-40B4-BE49-F238E27FC236}">
+                <a16:creationId xmlns:a16="http://schemas.microsoft.com/office/drawing/2014/main" id="{14F246A8-0F4F-46F6-B508-E3BEBAE9C1B3}"/>
+              </a:ext>
+            </a:extLst>
+          </p:cNvPr>
+          <p:cNvSpPr/>
+          <p:nvPr/>
+        </p:nvSpPr>
+        <p:spPr>
+          <a:xfrm>
+            <a:off x="1312235" y="5798335"/>
+            <a:ext cx="4276725" cy="45719"/>
+          </a:xfrm>
+          <a:prstGeom prst="rect">
+            <a:avLst/>
+          </a:prstGeom>
+          <a:solidFill>
+            <a:schemeClr val="bg1"/>
+          </a:solidFill>
+          <a:ln>
+            <a:noFill/>
+          </a:ln>
+        </p:spPr>
+        <p:style>
+          <a:lnRef idx="2">
+            <a:schemeClr val="accent1">
+              <a:shade val="50000"/>
+            </a:schemeClr>
+          </a:lnRef>
+          <a:fillRef idx="1">
+            <a:schemeClr val="accent1"/>
+          </a:fillRef>
+          <a:effectRef idx="0">
+            <a:schemeClr val="accent1"/>
+          </a:effectRef>
+          <a:fontRef idx="minor">
+            <a:schemeClr val="lt1"/>
+          </a:fontRef>
+        </p:style>
+        <p:txBody>
+          <a:bodyPr rtlCol="0" anchor="ctr"/>
+          <a:lstStyle/>
+          <a:p>
+            <a:pPr algn="ctr"/>
+            <a:endParaRPr lang="en-US"/>
+          </a:p>
+        </p:txBody>
+      </p:sp>
+      <p:cxnSp>
+        <p:nvCxnSpPr>
+          <p:cNvPr id="9" name="Straight Connector 8">
+            <a:extLst>
+              <a:ext uri="{FF2B5EF4-FFF2-40B4-BE49-F238E27FC236}">
+                <a16:creationId xmlns:a16="http://schemas.microsoft.com/office/drawing/2014/main" id="{BA5DE858-A25E-4A75-907A-CC00CE20C114}"/>
+              </a:ext>
+            </a:extLst>
+          </p:cNvPr>
+          <p:cNvCxnSpPr/>
+          <p:nvPr/>
+        </p:nvCxnSpPr>
+        <p:spPr>
+          <a:xfrm>
+            <a:off x="0" y="696286"/>
+            <a:ext cx="12192000" cy="0"/>
+          </a:xfrm>
+          <a:prstGeom prst="line">
+            <a:avLst/>
+          </a:prstGeom>
+        </p:spPr>
+        <p:style>
+          <a:lnRef idx="1">
+            <a:schemeClr val="accent1"/>
+          </a:lnRef>
+          <a:fillRef idx="0">
+            <a:schemeClr val="accent1"/>
+          </a:fillRef>
+          <a:effectRef idx="0">
+            <a:schemeClr val="accent1"/>
+          </a:effectRef>
+          <a:fontRef idx="minor">
+            <a:schemeClr val="tx1"/>
+          </a:fontRef>
+        </p:style>
+      </p:cxnSp>
+      <p:cxnSp>
+        <p:nvCxnSpPr>
+          <p:cNvPr id="10" name="Straight Connector 9">
+            <a:extLst>
+              <a:ext uri="{FF2B5EF4-FFF2-40B4-BE49-F238E27FC236}">
+                <a16:creationId xmlns:a16="http://schemas.microsoft.com/office/drawing/2014/main" id="{914AF08F-4958-4DB4-906C-19A11E251B3A}"/>
+              </a:ext>
+            </a:extLst>
+          </p:cNvPr>
+          <p:cNvCxnSpPr/>
+          <p:nvPr/>
+        </p:nvCxnSpPr>
+        <p:spPr>
+          <a:xfrm>
+            <a:off x="998290" y="0"/>
+            <a:ext cx="0" cy="6858000"/>
+          </a:xfrm>
+          <a:prstGeom prst="line">
+            <a:avLst/>
+          </a:prstGeom>
+        </p:spPr>
+        <p:style>
+          <a:lnRef idx="1">
+            <a:schemeClr val="accent1"/>
+          </a:lnRef>
+          <a:fillRef idx="0">
+            <a:schemeClr val="accent1"/>
+          </a:fillRef>
+          <a:effectRef idx="0">
+            <a:schemeClr val="accent1"/>
+          </a:effectRef>
+          <a:fontRef idx="minor">
+            <a:schemeClr val="tx1"/>
+          </a:fontRef>
+        </p:style>
+      </p:cxnSp>
+      <p:sp>
+        <p:nvSpPr>
+          <p:cNvPr id="11" name="Rectangle 10">
+            <a:extLst>
+              <a:ext uri="{FF2B5EF4-FFF2-40B4-BE49-F238E27FC236}">
+                <a16:creationId xmlns:a16="http://schemas.microsoft.com/office/drawing/2014/main" id="{CED4C335-9E10-47F2-A65D-7552DAB9F7BA}"/>
+              </a:ext>
+            </a:extLst>
+          </p:cNvPr>
+          <p:cNvSpPr/>
+          <p:nvPr/>
+        </p:nvSpPr>
+        <p:spPr>
+          <a:xfrm>
+            <a:off x="1312235" y="5732278"/>
+            <a:ext cx="3763199" cy="140184"/>
+          </a:xfrm>
+          <a:prstGeom prst="rect">
+            <a:avLst/>
+          </a:prstGeom>
+          <a:solidFill>
+            <a:schemeClr val="bg1"/>
+          </a:solidFill>
+          <a:ln>
+            <a:noFill/>
+          </a:ln>
+        </p:spPr>
+        <p:style>
+          <a:lnRef idx="2">
+            <a:schemeClr val="accent1">
+              <a:shade val="50000"/>
+            </a:schemeClr>
+          </a:lnRef>
+          <a:fillRef idx="1">
+            <a:schemeClr val="accent1"/>
+          </a:fillRef>
+          <a:effectRef idx="0">
+            <a:schemeClr val="accent1"/>
+          </a:effectRef>
+          <a:fontRef idx="minor">
+            <a:schemeClr val="lt1"/>
+          </a:fontRef>
+        </p:style>
+        <p:txBody>
+          <a:bodyPr rtlCol="0" anchor="ctr"/>
+          <a:lstStyle/>
+          <a:p>
+            <a:pPr algn="ctr"/>
+            <a:endParaRPr lang="en-US"/>
+          </a:p>
+        </p:txBody>
+      </p:sp>
+      <p:sp>
+        <p:nvSpPr>
+          <p:cNvPr id="12" name="TextBox 11">
+            <a:extLst>
+              <a:ext uri="{FF2B5EF4-FFF2-40B4-BE49-F238E27FC236}">
+                <a16:creationId xmlns:a16="http://schemas.microsoft.com/office/drawing/2014/main" id="{F3B9EC1D-CC50-45BA-9CB2-F79BC174919E}"/>
+              </a:ext>
+            </a:extLst>
+          </p:cNvPr>
+          <p:cNvSpPr txBox="1"/>
+          <p:nvPr/>
+        </p:nvSpPr>
+        <p:spPr>
+          <a:xfrm>
+            <a:off x="901305" y="5821194"/>
+            <a:ext cx="10972791" cy="584775"/>
+          </a:xfrm>
+          <a:prstGeom prst="rect">
+            <a:avLst/>
+          </a:prstGeom>
+          <a:noFill/>
+        </p:spPr>
+        <p:txBody>
+          <a:bodyPr wrap="square" rtlCol="0">
+            <a:spAutoFit/>
+          </a:bodyPr>
+          <a:lstStyle/>
+          <a:p>
+            <a:r>
+              <a:rPr lang="en-US" sz="1600" dirty="0"/>
+              <a:t>1. T. </a:t>
+            </a:r>
+            <a:r>
+              <a:rPr lang="en-US" sz="1600" dirty="0" err="1"/>
+              <a:t>Reinbacher</a:t>
+            </a:r>
+            <a:r>
+              <a:rPr lang="en-US" sz="1600" dirty="0"/>
+              <a:t>, K.Y. Rozier, J. Schumann. “Temporal-Logic Based Runtime Observer Pairs for System Health Management of Real-Time Systems.” TACAS 2014.</a:t>
+            </a:r>
+          </a:p>
+        </p:txBody>
+      </p:sp>
+    </p:spTree>
+    <p:extLst>
+      <p:ext uri="{BB962C8B-B14F-4D97-AF65-F5344CB8AC3E}">
+        <p14:creationId xmlns:p14="http://schemas.microsoft.com/office/powerpoint/2010/main" val="394537034"/>
+      </p:ext>
+    </p:extLst>
+  </p:cSld>
+  <p:clrMapOvr>
+    <a:masterClrMapping/>
+  </p:clrMapOvr>
+</p:sld>
+</file>
+
+<file path=ppt/slides/slide5.xml><?xml version="1.0" encoding="utf-8"?>
 <p:sld xmlns:a="http://schemas.openxmlformats.org/drawingml/2006/main" xmlns:r="http://schemas.openxmlformats.org/officeDocument/2006/relationships" xmlns:p="http://schemas.openxmlformats.org/presentationml/2006/main">
   <p:cSld>
     <p:spTree>
@@ -4424,7 +6006,7 @@
 </p:sld>
 </file>
 
-<file path=ppt/slides/slide4.xml><?xml version="1.0" encoding="utf-8"?>
+<file path=ppt/slides/slide6.xml><?xml version="1.0" encoding="utf-8"?>
 <p:sld xmlns:a="http://schemas.openxmlformats.org/drawingml/2006/main" xmlns:r="http://schemas.openxmlformats.org/officeDocument/2006/relationships" xmlns:p="http://schemas.openxmlformats.org/presentationml/2006/main">
   <p:cSld>
     <p:spTree>
@@ -4874,592 +6456,6 @@
     <p:extLst>
       <p:ext uri="{BB962C8B-B14F-4D97-AF65-F5344CB8AC3E}">
         <p14:creationId xmlns:p14="http://schemas.microsoft.com/office/powerpoint/2010/main" val="3531536948"/>
-      </p:ext>
-    </p:extLst>
-  </p:cSld>
-  <p:clrMapOvr>
-    <a:masterClrMapping/>
-  </p:clrMapOvr>
-</p:sld>
-</file>
-
-<file path=ppt/slides/slide5.xml><?xml version="1.0" encoding="utf-8"?>
-<p:sld xmlns:a="http://schemas.openxmlformats.org/drawingml/2006/main" xmlns:r="http://schemas.openxmlformats.org/officeDocument/2006/relationships" xmlns:p="http://schemas.openxmlformats.org/presentationml/2006/main">
-  <p:cSld>
-    <p:spTree>
-      <p:nvGrpSpPr>
-        <p:cNvPr id="1" name=""/>
-        <p:cNvGrpSpPr/>
-        <p:nvPr/>
-      </p:nvGrpSpPr>
-      <p:grpSpPr>
-        <a:xfrm>
-          <a:off x="0" y="0"/>
-          <a:ext cx="0" cy="0"/>
-          <a:chOff x="0" y="0"/>
-          <a:chExt cx="0" cy="0"/>
-        </a:xfrm>
-      </p:grpSpPr>
-      <p:sp>
-        <p:nvSpPr>
-          <p:cNvPr id="4" name="Title 1">
-            <a:extLst>
-              <a:ext uri="{FF2B5EF4-FFF2-40B4-BE49-F238E27FC236}">
-                <a16:creationId xmlns:a16="http://schemas.microsoft.com/office/drawing/2014/main" id="{2CFCF1F6-E26F-4763-8D05-21853A09EFBF}"/>
-              </a:ext>
-            </a:extLst>
-          </p:cNvPr>
-          <p:cNvSpPr>
-            <a:spLocks noGrp="1"/>
-          </p:cNvSpPr>
-          <p:nvPr>
-            <p:ph type="title"/>
-          </p:nvPr>
-        </p:nvSpPr>
-        <p:spPr>
-          <a:xfrm>
-            <a:off x="872761" y="181161"/>
-            <a:ext cx="10058401" cy="713522"/>
-          </a:xfrm>
-        </p:spPr>
-        <p:txBody>
-          <a:bodyPr>
-            <a:normAutofit fontScale="90000"/>
-          </a:bodyPr>
-          <a:lstStyle/>
-          <a:p>
-            <a:r>
-              <a:rPr lang="en-US" dirty="0"/>
-              <a:t>Mission-Bounded Linear Temporal Logic</a:t>
-            </a:r>
-            <a:r>
-              <a:rPr lang="en-US" baseline="30000" dirty="0"/>
-              <a:t>1</a:t>
-            </a:r>
-          </a:p>
-        </p:txBody>
-      </p:sp>
-      <p:sp>
-        <p:nvSpPr>
-          <p:cNvPr id="5" name="Rectangle 4">
-            <a:extLst>
-              <a:ext uri="{FF2B5EF4-FFF2-40B4-BE49-F238E27FC236}">
-                <a16:creationId xmlns:a16="http://schemas.microsoft.com/office/drawing/2014/main" id="{C1BFA22C-8BE9-4425-8F55-807A53F2C637}"/>
-              </a:ext>
-            </a:extLst>
-          </p:cNvPr>
-          <p:cNvSpPr/>
-          <p:nvPr/>
-        </p:nvSpPr>
-        <p:spPr>
-          <a:xfrm>
-            <a:off x="0" y="1485900"/>
-            <a:ext cx="12192000" cy="261257"/>
-          </a:xfrm>
-          <a:prstGeom prst="rect">
-            <a:avLst/>
-          </a:prstGeom>
-          <a:solidFill>
-            <a:schemeClr val="bg1"/>
-          </a:solidFill>
-          <a:ln>
-            <a:noFill/>
-          </a:ln>
-        </p:spPr>
-        <p:style>
-          <a:lnRef idx="2">
-            <a:schemeClr val="accent1">
-              <a:shade val="50000"/>
-            </a:schemeClr>
-          </a:lnRef>
-          <a:fillRef idx="1">
-            <a:schemeClr val="accent1"/>
-          </a:fillRef>
-          <a:effectRef idx="0">
-            <a:schemeClr val="accent1"/>
-          </a:effectRef>
-          <a:fontRef idx="minor">
-            <a:schemeClr val="lt1"/>
-          </a:fontRef>
-        </p:style>
-        <p:txBody>
-          <a:bodyPr rtlCol="0" anchor="ctr"/>
-          <a:lstStyle/>
-          <a:p>
-            <a:pPr algn="ctr"/>
-            <a:endParaRPr lang="en-US"/>
-          </a:p>
-        </p:txBody>
-      </p:sp>
-      <p:sp>
-        <p:nvSpPr>
-          <p:cNvPr id="3" name="Content Placeholder 2">
-            <a:extLst>
-              <a:ext uri="{FF2B5EF4-FFF2-40B4-BE49-F238E27FC236}">
-                <a16:creationId xmlns:a16="http://schemas.microsoft.com/office/drawing/2014/main" id="{2D04CCD1-563E-4627-8163-F2DD40EFEE03}"/>
-              </a:ext>
-            </a:extLst>
-          </p:cNvPr>
-          <p:cNvSpPr>
-            <a:spLocks noGrp="1"/>
-          </p:cNvSpPr>
-          <p:nvPr>
-            <p:ph idx="1"/>
-          </p:nvPr>
-        </p:nvSpPr>
-        <p:spPr>
-          <a:xfrm>
-            <a:off x="1097280" y="1160980"/>
-            <a:ext cx="10058400" cy="1736332"/>
-          </a:xfrm>
-        </p:spPr>
-        <p:txBody>
-          <a:bodyPr/>
-          <a:lstStyle/>
-          <a:p>
-            <a:pPr marL="0" indent="0">
-              <a:buNone/>
-            </a:pPr>
-            <a:r>
-              <a:rPr lang="en-US" dirty="0"/>
-              <a:t>Mission-Time Temporal Logic (MLTL) reasons about integer-bounded timelines:</a:t>
-            </a:r>
-          </a:p>
-          <a:p>
-            <a:pPr>
-              <a:buFont typeface="Arial" panose="020B0604020202020204" pitchFamily="34" charset="0"/>
-              <a:buChar char="•"/>
-            </a:pPr>
-            <a:r>
-              <a:rPr lang="en-US" dirty="0"/>
-              <a:t>  finite set of atomic propositions { p q }</a:t>
-            </a:r>
-          </a:p>
-          <a:p>
-            <a:pPr>
-              <a:buFont typeface="Arial" panose="020B0604020202020204" pitchFamily="34" charset="0"/>
-              <a:buChar char="•"/>
-            </a:pPr>
-            <a:r>
-              <a:rPr lang="en-US" dirty="0"/>
-              <a:t>  Boolean connectives:</a:t>
-            </a:r>
-          </a:p>
-          <a:p>
-            <a:pPr>
-              <a:buFont typeface="Arial" panose="020B0604020202020204" pitchFamily="34" charset="0"/>
-              <a:buChar char="•"/>
-            </a:pPr>
-            <a:r>
-              <a:rPr lang="en-US" dirty="0"/>
-              <a:t>  Temporal connectives with time bounds</a:t>
-            </a:r>
-          </a:p>
-        </p:txBody>
-      </p:sp>
-      <p:grpSp>
-        <p:nvGrpSpPr>
-          <p:cNvPr id="8" name="Group 7">
-            <a:extLst>
-              <a:ext uri="{FF2B5EF4-FFF2-40B4-BE49-F238E27FC236}">
-                <a16:creationId xmlns:a16="http://schemas.microsoft.com/office/drawing/2014/main" id="{A050AD7D-D285-4556-ABF2-BE89A0172DB0}"/>
-              </a:ext>
-            </a:extLst>
-          </p:cNvPr>
-          <p:cNvGrpSpPr/>
-          <p:nvPr/>
-        </p:nvGrpSpPr>
-        <p:grpSpPr>
-          <a:xfrm>
-            <a:off x="1400175" y="3222232"/>
-            <a:ext cx="9304983" cy="2980866"/>
-            <a:chOff x="1400175" y="3222232"/>
-            <a:chExt cx="9304983" cy="2980866"/>
-          </a:xfrm>
-        </p:grpSpPr>
-        <p:pic>
-          <p:nvPicPr>
-            <p:cNvPr id="6" name="Picture 5">
-              <a:extLst>
-                <a:ext uri="{FF2B5EF4-FFF2-40B4-BE49-F238E27FC236}">
-                  <a16:creationId xmlns:a16="http://schemas.microsoft.com/office/drawing/2014/main" id="{1B7EA449-279E-40BD-96A8-4A4749F7EBC7}"/>
-                </a:ext>
-              </a:extLst>
-            </p:cNvPr>
-            <p:cNvPicPr>
-              <a:picLocks noChangeAspect="1"/>
-            </p:cNvPicPr>
-            <p:nvPr/>
-          </p:nvPicPr>
-          <p:blipFill rotWithShape="1">
-            <a:blip r:embed="rId2"/>
-            <a:srcRect l="4467" t="19326" r="5703" b="28689"/>
-            <a:stretch/>
-          </p:blipFill>
-          <p:spPr>
-            <a:xfrm>
-              <a:off x="1547801" y="3222232"/>
-              <a:ext cx="9157357" cy="2980866"/>
-            </a:xfrm>
-            <a:prstGeom prst="rect">
-              <a:avLst/>
-            </a:prstGeom>
-          </p:spPr>
-        </p:pic>
-        <p:sp>
-          <p:nvSpPr>
-            <p:cNvPr id="7" name="Rectangle 6">
-              <a:extLst>
-                <a:ext uri="{FF2B5EF4-FFF2-40B4-BE49-F238E27FC236}">
-                  <a16:creationId xmlns:a16="http://schemas.microsoft.com/office/drawing/2014/main" id="{14F246A8-0F4F-46F6-B508-E3BEBAE9C1B3}"/>
-                </a:ext>
-              </a:extLst>
-            </p:cNvPr>
-            <p:cNvSpPr/>
-            <p:nvPr/>
-          </p:nvSpPr>
-          <p:spPr>
-            <a:xfrm>
-              <a:off x="1400175" y="6151830"/>
-              <a:ext cx="4276725" cy="45719"/>
-            </a:xfrm>
-            <a:prstGeom prst="rect">
-              <a:avLst/>
-            </a:prstGeom>
-            <a:solidFill>
-              <a:schemeClr val="bg1"/>
-            </a:solidFill>
-            <a:ln>
-              <a:noFill/>
-            </a:ln>
-          </p:spPr>
-          <p:style>
-            <a:lnRef idx="2">
-              <a:schemeClr val="accent1">
-                <a:shade val="50000"/>
-              </a:schemeClr>
-            </a:lnRef>
-            <a:fillRef idx="1">
-              <a:schemeClr val="accent1"/>
-            </a:fillRef>
-            <a:effectRef idx="0">
-              <a:schemeClr val="accent1"/>
-            </a:effectRef>
-            <a:fontRef idx="minor">
-              <a:schemeClr val="lt1"/>
-            </a:fontRef>
-          </p:style>
-          <p:txBody>
-            <a:bodyPr rtlCol="0" anchor="ctr"/>
-            <a:lstStyle/>
-            <a:p>
-              <a:pPr algn="ctr"/>
-              <a:endParaRPr lang="en-US"/>
-            </a:p>
-          </p:txBody>
-        </p:sp>
-      </p:grpSp>
-      <p:cxnSp>
-        <p:nvCxnSpPr>
-          <p:cNvPr id="9" name="Straight Connector 8">
-            <a:extLst>
-              <a:ext uri="{FF2B5EF4-FFF2-40B4-BE49-F238E27FC236}">
-                <a16:creationId xmlns:a16="http://schemas.microsoft.com/office/drawing/2014/main" id="{BA5DE858-A25E-4A75-907A-CC00CE20C114}"/>
-              </a:ext>
-            </a:extLst>
-          </p:cNvPr>
-          <p:cNvCxnSpPr/>
-          <p:nvPr/>
-        </p:nvCxnSpPr>
-        <p:spPr>
-          <a:xfrm>
-            <a:off x="0" y="696286"/>
-            <a:ext cx="12192000" cy="0"/>
-          </a:xfrm>
-          <a:prstGeom prst="line">
-            <a:avLst/>
-          </a:prstGeom>
-        </p:spPr>
-        <p:style>
-          <a:lnRef idx="1">
-            <a:schemeClr val="accent1"/>
-          </a:lnRef>
-          <a:fillRef idx="0">
-            <a:schemeClr val="accent1"/>
-          </a:fillRef>
-          <a:effectRef idx="0">
-            <a:schemeClr val="accent1"/>
-          </a:effectRef>
-          <a:fontRef idx="minor">
-            <a:schemeClr val="tx1"/>
-          </a:fontRef>
-        </p:style>
-      </p:cxnSp>
-      <p:cxnSp>
-        <p:nvCxnSpPr>
-          <p:cNvPr id="10" name="Straight Connector 9">
-            <a:extLst>
-              <a:ext uri="{FF2B5EF4-FFF2-40B4-BE49-F238E27FC236}">
-                <a16:creationId xmlns:a16="http://schemas.microsoft.com/office/drawing/2014/main" id="{914AF08F-4958-4DB4-906C-19A11E251B3A}"/>
-              </a:ext>
-            </a:extLst>
-          </p:cNvPr>
-          <p:cNvCxnSpPr/>
-          <p:nvPr/>
-        </p:nvCxnSpPr>
-        <p:spPr>
-          <a:xfrm>
-            <a:off x="998290" y="0"/>
-            <a:ext cx="0" cy="6858000"/>
-          </a:xfrm>
-          <a:prstGeom prst="line">
-            <a:avLst/>
-          </a:prstGeom>
-        </p:spPr>
-        <p:style>
-          <a:lnRef idx="1">
-            <a:schemeClr val="accent1"/>
-          </a:lnRef>
-          <a:fillRef idx="0">
-            <a:schemeClr val="accent1"/>
-          </a:fillRef>
-          <a:effectRef idx="0">
-            <a:schemeClr val="accent1"/>
-          </a:effectRef>
-          <a:fontRef idx="minor">
-            <a:schemeClr val="tx1"/>
-          </a:fontRef>
-        </p:style>
-      </p:cxnSp>
-    </p:spTree>
-    <p:extLst>
-      <p:ext uri="{BB962C8B-B14F-4D97-AF65-F5344CB8AC3E}">
-        <p14:creationId xmlns:p14="http://schemas.microsoft.com/office/powerpoint/2010/main" val="394537034"/>
-      </p:ext>
-    </p:extLst>
-  </p:cSld>
-  <p:clrMapOvr>
-    <a:masterClrMapping/>
-  </p:clrMapOvr>
-</p:sld>
-</file>
-
-<file path=ppt/slides/slide6.xml><?xml version="1.0" encoding="utf-8"?>
-<p:sld xmlns:a="http://schemas.openxmlformats.org/drawingml/2006/main" xmlns:r="http://schemas.openxmlformats.org/officeDocument/2006/relationships" xmlns:p="http://schemas.openxmlformats.org/presentationml/2006/main">
-  <p:cSld>
-    <p:spTree>
-      <p:nvGrpSpPr>
-        <p:cNvPr id="1" name=""/>
-        <p:cNvGrpSpPr/>
-        <p:nvPr/>
-      </p:nvGrpSpPr>
-      <p:grpSpPr>
-        <a:xfrm>
-          <a:off x="0" y="0"/>
-          <a:ext cx="0" cy="0"/>
-          <a:chOff x="0" y="0"/>
-          <a:chExt cx="0" cy="0"/>
-        </a:xfrm>
-      </p:grpSpPr>
-      <p:sp>
-        <p:nvSpPr>
-          <p:cNvPr id="6" name="Title 1">
-            <a:extLst>
-              <a:ext uri="{FF2B5EF4-FFF2-40B4-BE49-F238E27FC236}">
-                <a16:creationId xmlns:a16="http://schemas.microsoft.com/office/drawing/2014/main" id="{1DCBAEC9-CFD2-4D5B-8C00-467043C5CAF6}"/>
-              </a:ext>
-            </a:extLst>
-          </p:cNvPr>
-          <p:cNvSpPr>
-            <a:spLocks noGrp="1"/>
-          </p:cNvSpPr>
-          <p:nvPr>
-            <p:ph type="title"/>
-          </p:nvPr>
-        </p:nvSpPr>
-        <p:spPr>
-          <a:xfrm>
-            <a:off x="870568" y="198904"/>
-            <a:ext cx="10058400" cy="685800"/>
-          </a:xfrm>
-        </p:spPr>
-        <p:txBody>
-          <a:bodyPr>
-            <a:normAutofit fontScale="90000"/>
-          </a:bodyPr>
-          <a:lstStyle/>
-          <a:p>
-            <a:r>
-              <a:rPr lang="en-US" dirty="0"/>
-              <a:t>RV for a Real CubeSat Configuration</a:t>
-            </a:r>
-            <a:endParaRPr lang="en-US" baseline="30000" dirty="0"/>
-          </a:p>
-        </p:txBody>
-      </p:sp>
-      <p:sp>
-        <p:nvSpPr>
-          <p:cNvPr id="7" name="Rectangle 6">
-            <a:extLst>
-              <a:ext uri="{FF2B5EF4-FFF2-40B4-BE49-F238E27FC236}">
-                <a16:creationId xmlns:a16="http://schemas.microsoft.com/office/drawing/2014/main" id="{133D6C06-E59C-43A0-B3C4-397749D1CD46}"/>
-              </a:ext>
-            </a:extLst>
-          </p:cNvPr>
-          <p:cNvSpPr/>
-          <p:nvPr/>
-        </p:nvSpPr>
-        <p:spPr>
-          <a:xfrm>
-            <a:off x="0" y="1485900"/>
-            <a:ext cx="12192000" cy="261257"/>
-          </a:xfrm>
-          <a:prstGeom prst="rect">
-            <a:avLst/>
-          </a:prstGeom>
-          <a:solidFill>
-            <a:schemeClr val="bg1"/>
-          </a:solidFill>
-          <a:ln>
-            <a:noFill/>
-          </a:ln>
-        </p:spPr>
-        <p:style>
-          <a:lnRef idx="2">
-            <a:schemeClr val="accent1">
-              <a:shade val="50000"/>
-            </a:schemeClr>
-          </a:lnRef>
-          <a:fillRef idx="1">
-            <a:schemeClr val="accent1"/>
-          </a:fillRef>
-          <a:effectRef idx="0">
-            <a:schemeClr val="accent1"/>
-          </a:effectRef>
-          <a:fontRef idx="minor">
-            <a:schemeClr val="lt1"/>
-          </a:fontRef>
-        </p:style>
-        <p:txBody>
-          <a:bodyPr rtlCol="0" anchor="ctr"/>
-          <a:lstStyle/>
-          <a:p>
-            <a:pPr algn="ctr"/>
-            <a:endParaRPr lang="en-US"/>
-          </a:p>
-        </p:txBody>
-      </p:sp>
-      <p:pic>
-        <p:nvPicPr>
-          <p:cNvPr id="5" name="Content Placeholder 4" descr="Graphical user interface, text, application, chat or text message&#10;&#10;Description automatically generated">
-            <a:extLst>
-              <a:ext uri="{FF2B5EF4-FFF2-40B4-BE49-F238E27FC236}">
-                <a16:creationId xmlns:a16="http://schemas.microsoft.com/office/drawing/2014/main" id="{00993A35-0F9C-4BCA-948D-516722DD7C3B}"/>
-              </a:ext>
-            </a:extLst>
-          </p:cNvPr>
-          <p:cNvPicPr>
-            <a:picLocks noGrp="1" noChangeAspect="1"/>
-          </p:cNvPicPr>
-          <p:nvPr>
-            <p:ph idx="1"/>
-          </p:nvPr>
-        </p:nvPicPr>
-        <p:blipFill>
-          <a:blip r:embed="rId2">
-            <a:extLst>
-              <a:ext uri="{28A0092B-C50C-407E-A947-70E740481C1C}">
-                <a14:useLocalDpi xmlns:a14="http://schemas.microsoft.com/office/drawing/2010/main" val="0"/>
-              </a:ext>
-            </a:extLst>
-          </a:blip>
-          <a:stretch>
-            <a:fillRect/>
-          </a:stretch>
-        </p:blipFill>
-        <p:spPr>
-          <a:xfrm>
-            <a:off x="919067" y="1622820"/>
-            <a:ext cx="10414192" cy="4422251"/>
-          </a:xfrm>
-        </p:spPr>
-      </p:pic>
-      <p:cxnSp>
-        <p:nvCxnSpPr>
-          <p:cNvPr id="8" name="Straight Connector 7">
-            <a:extLst>
-              <a:ext uri="{FF2B5EF4-FFF2-40B4-BE49-F238E27FC236}">
-                <a16:creationId xmlns:a16="http://schemas.microsoft.com/office/drawing/2014/main" id="{0F76DE88-3076-4131-BB67-807933EEB12B}"/>
-              </a:ext>
-            </a:extLst>
-          </p:cNvPr>
-          <p:cNvCxnSpPr/>
-          <p:nvPr/>
-        </p:nvCxnSpPr>
-        <p:spPr>
-          <a:xfrm>
-            <a:off x="0" y="696286"/>
-            <a:ext cx="12192000" cy="0"/>
-          </a:xfrm>
-          <a:prstGeom prst="line">
-            <a:avLst/>
-          </a:prstGeom>
-        </p:spPr>
-        <p:style>
-          <a:lnRef idx="1">
-            <a:schemeClr val="accent1"/>
-          </a:lnRef>
-          <a:fillRef idx="0">
-            <a:schemeClr val="accent1"/>
-          </a:fillRef>
-          <a:effectRef idx="0">
-            <a:schemeClr val="accent1"/>
-          </a:effectRef>
-          <a:fontRef idx="minor">
-            <a:schemeClr val="tx1"/>
-          </a:fontRef>
-        </p:style>
-      </p:cxnSp>
-      <p:cxnSp>
-        <p:nvCxnSpPr>
-          <p:cNvPr id="9" name="Straight Connector 8">
-            <a:extLst>
-              <a:ext uri="{FF2B5EF4-FFF2-40B4-BE49-F238E27FC236}">
-                <a16:creationId xmlns:a16="http://schemas.microsoft.com/office/drawing/2014/main" id="{8826308A-67A4-4FA1-8B58-ED1668B11AF0}"/>
-              </a:ext>
-            </a:extLst>
-          </p:cNvPr>
-          <p:cNvCxnSpPr/>
-          <p:nvPr/>
-        </p:nvCxnSpPr>
-        <p:spPr>
-          <a:xfrm>
-            <a:off x="998290" y="0"/>
-            <a:ext cx="0" cy="6858000"/>
-          </a:xfrm>
-          <a:prstGeom prst="line">
-            <a:avLst/>
-          </a:prstGeom>
-        </p:spPr>
-        <p:style>
-          <a:lnRef idx="1">
-            <a:schemeClr val="accent1"/>
-          </a:lnRef>
-          <a:fillRef idx="0">
-            <a:schemeClr val="accent1"/>
-          </a:fillRef>
-          <a:effectRef idx="0">
-            <a:schemeClr val="accent1"/>
-          </a:effectRef>
-          <a:fontRef idx="minor">
-            <a:schemeClr val="tx1"/>
-          </a:fontRef>
-        </p:style>
-      </p:cxnSp>
-    </p:spTree>
-    <p:extLst>
-      <p:ext uri="{BB962C8B-B14F-4D97-AF65-F5344CB8AC3E}">
-        <p14:creationId xmlns:p14="http://schemas.microsoft.com/office/powerpoint/2010/main" val="864525112"/>
       </p:ext>
     </p:extLst>
   </p:cSld>
@@ -5488,74 +6484,10 @@
       </p:grpSpPr>
       <p:sp>
         <p:nvSpPr>
-          <p:cNvPr id="2" name="Title 1">
+          <p:cNvPr id="7" name="Rectangle 6">
             <a:extLst>
               <a:ext uri="{FF2B5EF4-FFF2-40B4-BE49-F238E27FC236}">
-                <a16:creationId xmlns:a16="http://schemas.microsoft.com/office/drawing/2014/main" id="{C3BBA8C6-8987-4F9B-954C-AEE5EB90F55F}"/>
-              </a:ext>
-            </a:extLst>
-          </p:cNvPr>
-          <p:cNvSpPr>
-            <a:spLocks noGrp="1"/>
-          </p:cNvSpPr>
-          <p:nvPr>
-            <p:ph type="title"/>
-          </p:nvPr>
-        </p:nvSpPr>
-        <p:spPr>
-          <a:xfrm>
-            <a:off x="786888" y="281984"/>
-            <a:ext cx="10058400" cy="714316"/>
-          </a:xfrm>
-        </p:spPr>
-        <p:txBody>
-          <a:bodyPr>
-            <a:normAutofit fontScale="90000"/>
-          </a:bodyPr>
-          <a:lstStyle/>
-          <a:p>
-            <a:r>
-              <a:rPr lang="en-US" dirty="0">
-                <a:solidFill>
-                  <a:schemeClr val="tx1"/>
-                </a:solidFill>
-              </a:rPr>
-              <a:t>Contributions</a:t>
-            </a:r>
-          </a:p>
-        </p:txBody>
-      </p:sp>
-      <p:sp>
-        <p:nvSpPr>
-          <p:cNvPr id="3" name="Content Placeholder 2">
-            <a:extLst>
-              <a:ext uri="{FF2B5EF4-FFF2-40B4-BE49-F238E27FC236}">
-                <a16:creationId xmlns:a16="http://schemas.microsoft.com/office/drawing/2014/main" id="{B60BB100-6F98-472D-8D7F-68FE278100F1}"/>
-              </a:ext>
-            </a:extLst>
-          </p:cNvPr>
-          <p:cNvSpPr>
-            <a:spLocks noGrp="1"/>
-          </p:cNvSpPr>
-          <p:nvPr>
-            <p:ph idx="1"/>
-          </p:nvPr>
-        </p:nvSpPr>
-        <p:spPr/>
-        <p:txBody>
-          <a:bodyPr/>
-          <a:lstStyle/>
-          <a:p>
-            <a:endParaRPr lang="en-US"/>
-          </a:p>
-        </p:txBody>
-      </p:sp>
-      <p:sp>
-        <p:nvSpPr>
-          <p:cNvPr id="4" name="Rectangle 3">
-            <a:extLst>
-              <a:ext uri="{FF2B5EF4-FFF2-40B4-BE49-F238E27FC236}">
-                <a16:creationId xmlns:a16="http://schemas.microsoft.com/office/drawing/2014/main" id="{FAC4B156-EDE6-47BC-B057-5268D00D99DC}"/>
+                <a16:creationId xmlns:a16="http://schemas.microsoft.com/office/drawing/2014/main" id="{E148745F-1186-40E6-845C-5C3836243D7C}"/>
               </a:ext>
             </a:extLst>
           </p:cNvPr>
@@ -5602,12 +6534,142 @@
           </a:p>
         </p:txBody>
       </p:sp>
+      <p:pic>
+        <p:nvPicPr>
+          <p:cNvPr id="9" name="Picture 8">
+            <a:extLst>
+              <a:ext uri="{FF2B5EF4-FFF2-40B4-BE49-F238E27FC236}">
+                <a16:creationId xmlns:a16="http://schemas.microsoft.com/office/drawing/2014/main" id="{8DCB66AB-0BBF-45DE-86DC-ADA5ED6ACF81}"/>
+              </a:ext>
+            </a:extLst>
+          </p:cNvPr>
+          <p:cNvPicPr>
+            <a:picLocks noChangeAspect="1"/>
+          </p:cNvPicPr>
+          <p:nvPr/>
+        </p:nvPicPr>
+        <p:blipFill rotWithShape="1">
+          <a:blip r:embed="rId2" cstate="screen">
+            <a:extLst>
+              <a:ext uri="{28A0092B-C50C-407E-A947-70E740481C1C}">
+                <a14:useLocalDpi xmlns:a14="http://schemas.microsoft.com/office/drawing/2010/main"/>
+              </a:ext>
+            </a:extLst>
+          </a:blip>
+          <a:srcRect/>
+          <a:stretch/>
+        </p:blipFill>
+        <p:spPr>
+          <a:xfrm>
+            <a:off x="833120" y="1032757"/>
+            <a:ext cx="10845294" cy="1408480"/>
+          </a:xfrm>
+          <a:prstGeom prst="rect">
+            <a:avLst/>
+          </a:prstGeom>
+        </p:spPr>
+      </p:pic>
+      <p:sp>
+        <p:nvSpPr>
+          <p:cNvPr id="4" name="Title 1">
+            <a:extLst>
+              <a:ext uri="{FF2B5EF4-FFF2-40B4-BE49-F238E27FC236}">
+                <a16:creationId xmlns:a16="http://schemas.microsoft.com/office/drawing/2014/main" id="{F01CE361-3908-4010-8031-51EEC67FB2EE}"/>
+              </a:ext>
+            </a:extLst>
+          </p:cNvPr>
+          <p:cNvSpPr>
+            <a:spLocks noGrp="1"/>
+          </p:cNvSpPr>
+          <p:nvPr>
+            <p:ph type="title"/>
+          </p:nvPr>
+        </p:nvSpPr>
+        <p:spPr>
+          <a:xfrm>
+            <a:off x="894080" y="235994"/>
+            <a:ext cx="10058400" cy="651346"/>
+          </a:xfrm>
+        </p:spPr>
+        <p:txBody>
+          <a:bodyPr>
+            <a:normAutofit fontScale="90000"/>
+          </a:bodyPr>
+          <a:lstStyle/>
+          <a:p>
+            <a:r>
+              <a:rPr lang="en-US" dirty="0">
+                <a:solidFill>
+                  <a:schemeClr val="tx1"/>
+                </a:solidFill>
+              </a:rPr>
+              <a:t>Sample Telemetry Message</a:t>
+            </a:r>
+          </a:p>
+        </p:txBody>
+      </p:sp>
+      <p:sp>
+        <p:nvSpPr>
+          <p:cNvPr id="10" name="Content Placeholder 9">
+            <a:extLst>
+              <a:ext uri="{FF2B5EF4-FFF2-40B4-BE49-F238E27FC236}">
+                <a16:creationId xmlns:a16="http://schemas.microsoft.com/office/drawing/2014/main" id="{70E54780-5B81-49D6-8F68-4DC086C93F58}"/>
+              </a:ext>
+            </a:extLst>
+          </p:cNvPr>
+          <p:cNvSpPr>
+            <a:spLocks noGrp="1"/>
+          </p:cNvSpPr>
+          <p:nvPr>
+            <p:ph idx="1"/>
+          </p:nvPr>
+        </p:nvSpPr>
+        <p:spPr>
+          <a:xfrm>
+            <a:off x="1097280" y="3332480"/>
+            <a:ext cx="8371837" cy="2536614"/>
+          </a:xfrm>
+        </p:spPr>
+        <p:txBody>
+          <a:bodyPr>
+            <a:normAutofit/>
+          </a:bodyPr>
+          <a:lstStyle/>
+          <a:p>
+            <a:pPr>
+              <a:buFont typeface="Arial" panose="020B0604020202020204" pitchFamily="34" charset="0"/>
+              <a:buChar char="•"/>
+            </a:pPr>
+            <a:r>
+              <a:rPr lang="en-US" sz="2800" dirty="0"/>
+              <a:t>  Highly simplified message</a:t>
+            </a:r>
+          </a:p>
+          <a:p>
+            <a:pPr>
+              <a:buFont typeface="Arial" panose="020B0604020202020204" pitchFamily="34" charset="0"/>
+              <a:buChar char="•"/>
+            </a:pPr>
+            <a:endParaRPr lang="en-US" sz="2800" dirty="0"/>
+          </a:p>
+          <a:p>
+            <a:pPr>
+              <a:buFont typeface="Arial" panose="020B0604020202020204" pitchFamily="34" charset="0"/>
+              <a:buChar char="•"/>
+            </a:pPr>
+            <a:r>
+              <a:rPr lang="en-US" sz="2800" dirty="0"/>
+              <a:t>  Parameters are either essential ID info, or relate to communications system</a:t>
+            </a:r>
+          </a:p>
+        </p:txBody>
+      </p:sp>
       <p:cxnSp>
         <p:nvCxnSpPr>
           <p:cNvPr id="5" name="Straight Connector 4">
             <a:extLst>
               <a:ext uri="{FF2B5EF4-FFF2-40B4-BE49-F238E27FC236}">
-                <a16:creationId xmlns:a16="http://schemas.microsoft.com/office/drawing/2014/main" id="{852DE64C-1FCC-422C-810C-12578D28B28D}"/>
+                <a16:creationId xmlns:a16="http://schemas.microsoft.com/office/drawing/2014/main" id="{397F0993-A969-411E-B5EA-2BA8489BE646}"/>
               </a:ext>
             </a:extLst>
           </p:cNvPr>
@@ -5643,7 +6705,7 @@
           <p:cNvPr id="6" name="Straight Connector 5">
             <a:extLst>
               <a:ext uri="{FF2B5EF4-FFF2-40B4-BE49-F238E27FC236}">
-                <a16:creationId xmlns:a16="http://schemas.microsoft.com/office/drawing/2014/main" id="{73168877-2FD4-412A-9927-7C792A1275C4}"/>
+                <a16:creationId xmlns:a16="http://schemas.microsoft.com/office/drawing/2014/main" id="{CB1627D8-9799-419F-9DEB-585790B32D06}"/>
               </a:ext>
             </a:extLst>
           </p:cNvPr>
@@ -5677,7 +6739,570 @@
     </p:spTree>
     <p:extLst>
       <p:ext uri="{BB962C8B-B14F-4D97-AF65-F5344CB8AC3E}">
-        <p14:creationId xmlns:p14="http://schemas.microsoft.com/office/powerpoint/2010/main" val="1121272991"/>
+        <p14:creationId xmlns:p14="http://schemas.microsoft.com/office/powerpoint/2010/main" val="2793260569"/>
+      </p:ext>
+    </p:extLst>
+  </p:cSld>
+  <p:clrMapOvr>
+    <a:masterClrMapping/>
+  </p:clrMapOvr>
+</p:sld>
+</file>
+
+<file path=ppt/slides/slide8.xml><?xml version="1.0" encoding="utf-8"?>
+<p:sld xmlns:a="http://schemas.openxmlformats.org/drawingml/2006/main" xmlns:r="http://schemas.openxmlformats.org/officeDocument/2006/relationships" xmlns:p="http://schemas.openxmlformats.org/presentationml/2006/main">
+  <p:cSld>
+    <p:spTree>
+      <p:nvGrpSpPr>
+        <p:cNvPr id="1" name=""/>
+        <p:cNvGrpSpPr/>
+        <p:nvPr/>
+      </p:nvGrpSpPr>
+      <p:grpSpPr>
+        <a:xfrm>
+          <a:off x="0" y="0"/>
+          <a:ext cx="0" cy="0"/>
+          <a:chOff x="0" y="0"/>
+          <a:chExt cx="0" cy="0"/>
+        </a:xfrm>
+      </p:grpSpPr>
+      <p:sp>
+        <p:nvSpPr>
+          <p:cNvPr id="4" name="Rectangle 3">
+            <a:extLst>
+              <a:ext uri="{FF2B5EF4-FFF2-40B4-BE49-F238E27FC236}">
+                <a16:creationId xmlns:a16="http://schemas.microsoft.com/office/drawing/2014/main" id="{4E0B42D7-C09D-4436-BB51-CE6BF13BDCD1}"/>
+              </a:ext>
+            </a:extLst>
+          </p:cNvPr>
+          <p:cNvSpPr/>
+          <p:nvPr/>
+        </p:nvSpPr>
+        <p:spPr>
+          <a:xfrm>
+            <a:off x="862964" y="1371600"/>
+            <a:ext cx="10633711" cy="619125"/>
+          </a:xfrm>
+          <a:prstGeom prst="rect">
+            <a:avLst/>
+          </a:prstGeom>
+          <a:solidFill>
+            <a:schemeClr val="bg1"/>
+          </a:solidFill>
+          <a:ln>
+            <a:noFill/>
+          </a:ln>
+        </p:spPr>
+        <p:style>
+          <a:lnRef idx="2">
+            <a:schemeClr val="accent1">
+              <a:shade val="50000"/>
+            </a:schemeClr>
+          </a:lnRef>
+          <a:fillRef idx="1">
+            <a:schemeClr val="accent1"/>
+          </a:fillRef>
+          <a:effectRef idx="0">
+            <a:schemeClr val="accent1"/>
+          </a:effectRef>
+          <a:fontRef idx="minor">
+            <a:schemeClr val="lt1"/>
+          </a:fontRef>
+        </p:style>
+        <p:txBody>
+          <a:bodyPr rtlCol="0" anchor="ctr"/>
+          <a:lstStyle/>
+          <a:p>
+            <a:pPr algn="ctr"/>
+            <a:endParaRPr lang="en-US"/>
+          </a:p>
+        </p:txBody>
+      </p:sp>
+      <p:sp>
+        <p:nvSpPr>
+          <p:cNvPr id="2" name="Title 1">
+            <a:extLst>
+              <a:ext uri="{FF2B5EF4-FFF2-40B4-BE49-F238E27FC236}">
+                <a16:creationId xmlns:a16="http://schemas.microsoft.com/office/drawing/2014/main" id="{C561A7BA-23D9-4F1E-A4A8-57962C20BA01}"/>
+              </a:ext>
+            </a:extLst>
+          </p:cNvPr>
+          <p:cNvSpPr>
+            <a:spLocks noGrp="1"/>
+          </p:cNvSpPr>
+          <p:nvPr>
+            <p:ph type="title"/>
+          </p:nvPr>
+        </p:nvSpPr>
+        <p:spPr>
+          <a:xfrm>
+            <a:off x="872489" y="177066"/>
+            <a:ext cx="10466071" cy="713522"/>
+          </a:xfrm>
+        </p:spPr>
+        <p:txBody>
+          <a:bodyPr>
+            <a:normAutofit fontScale="90000"/>
+          </a:bodyPr>
+          <a:lstStyle/>
+          <a:p>
+            <a:r>
+              <a:rPr lang="en-US" dirty="0"/>
+              <a:t>Results (Slide 1)</a:t>
+            </a:r>
+          </a:p>
+        </p:txBody>
+      </p:sp>
+      <p:cxnSp>
+        <p:nvCxnSpPr>
+          <p:cNvPr id="5" name="Straight Connector 4">
+            <a:extLst>
+              <a:ext uri="{FF2B5EF4-FFF2-40B4-BE49-F238E27FC236}">
+                <a16:creationId xmlns:a16="http://schemas.microsoft.com/office/drawing/2014/main" id="{DF3F109B-303B-46F0-9FB4-55E516F17800}"/>
+              </a:ext>
+            </a:extLst>
+          </p:cNvPr>
+          <p:cNvCxnSpPr/>
+          <p:nvPr/>
+        </p:nvCxnSpPr>
+        <p:spPr>
+          <a:xfrm>
+            <a:off x="0" y="696286"/>
+            <a:ext cx="12192000" cy="0"/>
+          </a:xfrm>
+          <a:prstGeom prst="line">
+            <a:avLst/>
+          </a:prstGeom>
+        </p:spPr>
+        <p:style>
+          <a:lnRef idx="1">
+            <a:schemeClr val="accent1"/>
+          </a:lnRef>
+          <a:fillRef idx="0">
+            <a:schemeClr val="accent1"/>
+          </a:fillRef>
+          <a:effectRef idx="0">
+            <a:schemeClr val="accent1"/>
+          </a:effectRef>
+          <a:fontRef idx="minor">
+            <a:schemeClr val="tx1"/>
+          </a:fontRef>
+        </p:style>
+      </p:cxnSp>
+      <p:cxnSp>
+        <p:nvCxnSpPr>
+          <p:cNvPr id="6" name="Straight Connector 5">
+            <a:extLst>
+              <a:ext uri="{FF2B5EF4-FFF2-40B4-BE49-F238E27FC236}">
+                <a16:creationId xmlns:a16="http://schemas.microsoft.com/office/drawing/2014/main" id="{34B1ABB4-F4BF-44B8-893A-4076B56F90D5}"/>
+              </a:ext>
+            </a:extLst>
+          </p:cNvPr>
+          <p:cNvCxnSpPr/>
+          <p:nvPr/>
+        </p:nvCxnSpPr>
+        <p:spPr>
+          <a:xfrm>
+            <a:off x="998290" y="0"/>
+            <a:ext cx="0" cy="6858000"/>
+          </a:xfrm>
+          <a:prstGeom prst="line">
+            <a:avLst/>
+          </a:prstGeom>
+        </p:spPr>
+        <p:style>
+          <a:lnRef idx="1">
+            <a:schemeClr val="accent1"/>
+          </a:lnRef>
+          <a:fillRef idx="0">
+            <a:schemeClr val="accent1"/>
+          </a:fillRef>
+          <a:effectRef idx="0">
+            <a:schemeClr val="accent1"/>
+          </a:effectRef>
+          <a:fontRef idx="minor">
+            <a:schemeClr val="tx1"/>
+          </a:fontRef>
+        </p:style>
+      </p:cxnSp>
+      <p:pic>
+        <p:nvPicPr>
+          <p:cNvPr id="7" name="Picture 6">
+            <a:extLst>
+              <a:ext uri="{FF2B5EF4-FFF2-40B4-BE49-F238E27FC236}">
+                <a16:creationId xmlns:a16="http://schemas.microsoft.com/office/drawing/2014/main" id="{A0BD5B62-6157-4D5C-ABF9-220DDAE937B3}"/>
+              </a:ext>
+            </a:extLst>
+          </p:cNvPr>
+          <p:cNvPicPr>
+            <a:picLocks noChangeAspect="1"/>
+          </p:cNvPicPr>
+          <p:nvPr/>
+        </p:nvPicPr>
+        <p:blipFill rotWithShape="1">
+          <a:blip r:embed="rId2" cstate="screen">
+            <a:extLst>
+              <a:ext uri="{28A0092B-C50C-407E-A947-70E740481C1C}">
+                <a14:useLocalDpi xmlns:a14="http://schemas.microsoft.com/office/drawing/2010/main"/>
+              </a:ext>
+            </a:extLst>
+          </a:blip>
+          <a:srcRect/>
+          <a:stretch/>
+        </p:blipFill>
+        <p:spPr>
+          <a:xfrm>
+            <a:off x="2251073" y="1067654"/>
+            <a:ext cx="7708902" cy="1771829"/>
+          </a:xfrm>
+          <a:prstGeom prst="rect">
+            <a:avLst/>
+          </a:prstGeom>
+        </p:spPr>
+      </p:pic>
+      <p:pic>
+        <p:nvPicPr>
+          <p:cNvPr id="8" name="Picture 7">
+            <a:extLst>
+              <a:ext uri="{FF2B5EF4-FFF2-40B4-BE49-F238E27FC236}">
+                <a16:creationId xmlns:a16="http://schemas.microsoft.com/office/drawing/2014/main" id="{A4C804B6-9379-4C0B-9FAA-86C7DD5E1EE3}"/>
+              </a:ext>
+            </a:extLst>
+          </p:cNvPr>
+          <p:cNvPicPr>
+            <a:picLocks noChangeAspect="1"/>
+          </p:cNvPicPr>
+          <p:nvPr/>
+        </p:nvPicPr>
+        <p:blipFill rotWithShape="1">
+          <a:blip r:embed="rId3" cstate="screen">
+            <a:extLst>
+              <a:ext uri="{28A0092B-C50C-407E-A947-70E740481C1C}">
+                <a14:useLocalDpi xmlns:a14="http://schemas.microsoft.com/office/drawing/2010/main"/>
+              </a:ext>
+            </a:extLst>
+          </a:blip>
+          <a:srcRect b="1765"/>
+          <a:stretch/>
+        </p:blipFill>
+        <p:spPr>
+          <a:xfrm>
+            <a:off x="3083560" y="3143429"/>
+            <a:ext cx="6024879" cy="3145611"/>
+          </a:xfrm>
+          <a:prstGeom prst="rect">
+            <a:avLst/>
+          </a:prstGeom>
+        </p:spPr>
+      </p:pic>
+    </p:spTree>
+    <p:extLst>
+      <p:ext uri="{BB962C8B-B14F-4D97-AF65-F5344CB8AC3E}">
+        <p14:creationId xmlns:p14="http://schemas.microsoft.com/office/powerpoint/2010/main" val="1798688396"/>
+      </p:ext>
+    </p:extLst>
+  </p:cSld>
+  <p:clrMapOvr>
+    <a:masterClrMapping/>
+  </p:clrMapOvr>
+</p:sld>
+</file>
+
+<file path=ppt/slides/slide9.xml><?xml version="1.0" encoding="utf-8"?>
+<p:sld xmlns:a="http://schemas.openxmlformats.org/drawingml/2006/main" xmlns:r="http://schemas.openxmlformats.org/officeDocument/2006/relationships" xmlns:p="http://schemas.openxmlformats.org/presentationml/2006/main">
+  <p:cSld>
+    <p:spTree>
+      <p:nvGrpSpPr>
+        <p:cNvPr id="1" name=""/>
+        <p:cNvGrpSpPr/>
+        <p:nvPr/>
+      </p:nvGrpSpPr>
+      <p:grpSpPr>
+        <a:xfrm>
+          <a:off x="0" y="0"/>
+          <a:ext cx="0" cy="0"/>
+          <a:chOff x="0" y="0"/>
+          <a:chExt cx="0" cy="0"/>
+        </a:xfrm>
+      </p:grpSpPr>
+      <p:sp>
+        <p:nvSpPr>
+          <p:cNvPr id="4" name="Rectangle 3">
+            <a:extLst>
+              <a:ext uri="{FF2B5EF4-FFF2-40B4-BE49-F238E27FC236}">
+                <a16:creationId xmlns:a16="http://schemas.microsoft.com/office/drawing/2014/main" id="{4E0B42D7-C09D-4436-BB51-CE6BF13BDCD1}"/>
+              </a:ext>
+            </a:extLst>
+          </p:cNvPr>
+          <p:cNvSpPr/>
+          <p:nvPr/>
+        </p:nvSpPr>
+        <p:spPr>
+          <a:xfrm>
+            <a:off x="862964" y="1371600"/>
+            <a:ext cx="10633711" cy="619125"/>
+          </a:xfrm>
+          <a:prstGeom prst="rect">
+            <a:avLst/>
+          </a:prstGeom>
+          <a:solidFill>
+            <a:schemeClr val="bg1"/>
+          </a:solidFill>
+          <a:ln>
+            <a:noFill/>
+          </a:ln>
+        </p:spPr>
+        <p:style>
+          <a:lnRef idx="2">
+            <a:schemeClr val="accent1">
+              <a:shade val="50000"/>
+            </a:schemeClr>
+          </a:lnRef>
+          <a:fillRef idx="1">
+            <a:schemeClr val="accent1"/>
+          </a:fillRef>
+          <a:effectRef idx="0">
+            <a:schemeClr val="accent1"/>
+          </a:effectRef>
+          <a:fontRef idx="minor">
+            <a:schemeClr val="lt1"/>
+          </a:fontRef>
+        </p:style>
+        <p:txBody>
+          <a:bodyPr rtlCol="0" anchor="ctr"/>
+          <a:lstStyle/>
+          <a:p>
+            <a:pPr algn="ctr"/>
+            <a:endParaRPr lang="en-US"/>
+          </a:p>
+        </p:txBody>
+      </p:sp>
+      <p:sp>
+        <p:nvSpPr>
+          <p:cNvPr id="2" name="Title 1">
+            <a:extLst>
+              <a:ext uri="{FF2B5EF4-FFF2-40B4-BE49-F238E27FC236}">
+                <a16:creationId xmlns:a16="http://schemas.microsoft.com/office/drawing/2014/main" id="{C561A7BA-23D9-4F1E-A4A8-57962C20BA01}"/>
+              </a:ext>
+            </a:extLst>
+          </p:cNvPr>
+          <p:cNvSpPr>
+            <a:spLocks noGrp="1"/>
+          </p:cNvSpPr>
+          <p:nvPr>
+            <p:ph type="title"/>
+          </p:nvPr>
+        </p:nvSpPr>
+        <p:spPr>
+          <a:xfrm>
+            <a:off x="872489" y="177066"/>
+            <a:ext cx="10466071" cy="713522"/>
+          </a:xfrm>
+        </p:spPr>
+        <p:txBody>
+          <a:bodyPr>
+            <a:normAutofit fontScale="90000"/>
+          </a:bodyPr>
+          <a:lstStyle/>
+          <a:p>
+            <a:r>
+              <a:rPr lang="en-US" dirty="0"/>
+              <a:t>Results (Slide 2)</a:t>
+            </a:r>
+          </a:p>
+        </p:txBody>
+      </p:sp>
+      <p:sp>
+        <p:nvSpPr>
+          <p:cNvPr id="3" name="Content Placeholder 2">
+            <a:extLst>
+              <a:ext uri="{FF2B5EF4-FFF2-40B4-BE49-F238E27FC236}">
+                <a16:creationId xmlns:a16="http://schemas.microsoft.com/office/drawing/2014/main" id="{6E03FFBB-11B0-49C5-B432-B70CE967126B}"/>
+              </a:ext>
+            </a:extLst>
+          </p:cNvPr>
+          <p:cNvSpPr>
+            <a:spLocks noGrp="1"/>
+          </p:cNvSpPr>
+          <p:nvPr>
+            <p:ph idx="1"/>
+          </p:nvPr>
+        </p:nvSpPr>
+        <p:spPr>
+          <a:xfrm>
+            <a:off x="998290" y="1095375"/>
+            <a:ext cx="11041310" cy="5238750"/>
+          </a:xfrm>
+        </p:spPr>
+        <p:txBody>
+          <a:bodyPr>
+            <a:normAutofit/>
+          </a:bodyPr>
+          <a:lstStyle/>
+          <a:p>
+            <a:pPr marL="0" indent="0">
+              <a:spcBef>
+                <a:spcPts val="0"/>
+              </a:spcBef>
+              <a:spcAft>
+                <a:spcPts val="0"/>
+              </a:spcAft>
+              <a:buNone/>
+            </a:pPr>
+            <a:r>
+              <a:rPr lang="en-US" sz="2800" dirty="0"/>
+              <a:t>  </a:t>
+            </a:r>
+            <a:endParaRPr lang="en-US" sz="2400" dirty="0"/>
+          </a:p>
+        </p:txBody>
+      </p:sp>
+      <p:cxnSp>
+        <p:nvCxnSpPr>
+          <p:cNvPr id="5" name="Straight Connector 4">
+            <a:extLst>
+              <a:ext uri="{FF2B5EF4-FFF2-40B4-BE49-F238E27FC236}">
+                <a16:creationId xmlns:a16="http://schemas.microsoft.com/office/drawing/2014/main" id="{DF3F109B-303B-46F0-9FB4-55E516F17800}"/>
+              </a:ext>
+            </a:extLst>
+          </p:cNvPr>
+          <p:cNvCxnSpPr/>
+          <p:nvPr/>
+        </p:nvCxnSpPr>
+        <p:spPr>
+          <a:xfrm>
+            <a:off x="0" y="696286"/>
+            <a:ext cx="12192000" cy="0"/>
+          </a:xfrm>
+          <a:prstGeom prst="line">
+            <a:avLst/>
+          </a:prstGeom>
+        </p:spPr>
+        <p:style>
+          <a:lnRef idx="1">
+            <a:schemeClr val="accent1"/>
+          </a:lnRef>
+          <a:fillRef idx="0">
+            <a:schemeClr val="accent1"/>
+          </a:fillRef>
+          <a:effectRef idx="0">
+            <a:schemeClr val="accent1"/>
+          </a:effectRef>
+          <a:fontRef idx="minor">
+            <a:schemeClr val="tx1"/>
+          </a:fontRef>
+        </p:style>
+      </p:cxnSp>
+      <p:cxnSp>
+        <p:nvCxnSpPr>
+          <p:cNvPr id="6" name="Straight Connector 5">
+            <a:extLst>
+              <a:ext uri="{FF2B5EF4-FFF2-40B4-BE49-F238E27FC236}">
+                <a16:creationId xmlns:a16="http://schemas.microsoft.com/office/drawing/2014/main" id="{34B1ABB4-F4BF-44B8-893A-4076B56F90D5}"/>
+              </a:ext>
+            </a:extLst>
+          </p:cNvPr>
+          <p:cNvCxnSpPr/>
+          <p:nvPr/>
+        </p:nvCxnSpPr>
+        <p:spPr>
+          <a:xfrm>
+            <a:off x="998290" y="0"/>
+            <a:ext cx="0" cy="6858000"/>
+          </a:xfrm>
+          <a:prstGeom prst="line">
+            <a:avLst/>
+          </a:prstGeom>
+        </p:spPr>
+        <p:style>
+          <a:lnRef idx="1">
+            <a:schemeClr val="accent1"/>
+          </a:lnRef>
+          <a:fillRef idx="0">
+            <a:schemeClr val="accent1"/>
+          </a:fillRef>
+          <a:effectRef idx="0">
+            <a:schemeClr val="accent1"/>
+          </a:effectRef>
+          <a:fontRef idx="minor">
+            <a:schemeClr val="tx1"/>
+          </a:fontRef>
+        </p:style>
+      </p:cxnSp>
+      <p:pic>
+        <p:nvPicPr>
+          <p:cNvPr id="7" name="Picture 6">
+            <a:extLst>
+              <a:ext uri="{FF2B5EF4-FFF2-40B4-BE49-F238E27FC236}">
+                <a16:creationId xmlns:a16="http://schemas.microsoft.com/office/drawing/2014/main" id="{4D077A8E-324C-4799-A546-DB7751E4181C}"/>
+              </a:ext>
+            </a:extLst>
+          </p:cNvPr>
+          <p:cNvPicPr>
+            <a:picLocks noChangeAspect="1"/>
+          </p:cNvPicPr>
+          <p:nvPr/>
+        </p:nvPicPr>
+        <p:blipFill rotWithShape="1">
+          <a:blip r:embed="rId2" cstate="screen">
+            <a:extLst>
+              <a:ext uri="{28A0092B-C50C-407E-A947-70E740481C1C}">
+                <a14:useLocalDpi xmlns:a14="http://schemas.microsoft.com/office/drawing/2010/main"/>
+              </a:ext>
+            </a:extLst>
+          </a:blip>
+          <a:srcRect/>
+          <a:stretch/>
+        </p:blipFill>
+        <p:spPr>
+          <a:xfrm>
+            <a:off x="2075733" y="3222889"/>
+            <a:ext cx="8059582" cy="3111236"/>
+          </a:xfrm>
+          <a:prstGeom prst="rect">
+            <a:avLst/>
+          </a:prstGeom>
+        </p:spPr>
+      </p:pic>
+      <p:pic>
+        <p:nvPicPr>
+          <p:cNvPr id="8" name="Picture 7">
+            <a:extLst>
+              <a:ext uri="{FF2B5EF4-FFF2-40B4-BE49-F238E27FC236}">
+                <a16:creationId xmlns:a16="http://schemas.microsoft.com/office/drawing/2014/main" id="{D5701B10-27CD-4EC5-ABEF-D5F515CD5CA9}"/>
+              </a:ext>
+            </a:extLst>
+          </p:cNvPr>
+          <p:cNvPicPr>
+            <a:picLocks noChangeAspect="1"/>
+          </p:cNvPicPr>
+          <p:nvPr/>
+        </p:nvPicPr>
+        <p:blipFill rotWithShape="1">
+          <a:blip r:embed="rId3" cstate="screen">
+            <a:extLst>
+              <a:ext uri="{28A0092B-C50C-407E-A947-70E740481C1C}">
+                <a14:useLocalDpi xmlns:a14="http://schemas.microsoft.com/office/drawing/2010/main"/>
+              </a:ext>
+            </a:extLst>
+          </a:blip>
+          <a:srcRect/>
+          <a:stretch/>
+        </p:blipFill>
+        <p:spPr>
+          <a:xfrm>
+            <a:off x="1773438" y="942662"/>
+            <a:ext cx="8645124" cy="2096126"/>
+          </a:xfrm>
+          <a:prstGeom prst="rect">
+            <a:avLst/>
+          </a:prstGeom>
+        </p:spPr>
+      </p:pic>
+    </p:spTree>
+    <p:extLst>
+      <p:ext uri="{BB962C8B-B14F-4D97-AF65-F5344CB8AC3E}">
+        <p14:creationId xmlns:p14="http://schemas.microsoft.com/office/powerpoint/2010/main" val="130486745"/>
       </p:ext>
     </p:extLst>
   </p:cSld>

</xml_diff>